<commit_message>
Add two more slides
</commit_message>
<xml_diff>
--- a/OPC UA and Industry 4.0.pptx
+++ b/OPC UA and Industry 4.0.pptx
@@ -8,23 +8,25 @@
     <p:sldId id="256" r:id="rId2"/>
     <p:sldId id="257" r:id="rId3"/>
     <p:sldId id="258" r:id="rId4"/>
-    <p:sldId id="260" r:id="rId5"/>
-    <p:sldId id="261" r:id="rId6"/>
-    <p:sldId id="259" r:id="rId7"/>
-    <p:sldId id="262" r:id="rId8"/>
-    <p:sldId id="269" r:id="rId9"/>
-    <p:sldId id="271" r:id="rId10"/>
-    <p:sldId id="272" r:id="rId11"/>
-    <p:sldId id="263" r:id="rId12"/>
-    <p:sldId id="264" r:id="rId13"/>
-    <p:sldId id="265" r:id="rId14"/>
-    <p:sldId id="275" r:id="rId15"/>
-    <p:sldId id="266" r:id="rId16"/>
-    <p:sldId id="274" r:id="rId17"/>
-    <p:sldId id="267" r:id="rId18"/>
-    <p:sldId id="270" r:id="rId19"/>
-    <p:sldId id="268" r:id="rId20"/>
-    <p:sldId id="273" r:id="rId21"/>
+    <p:sldId id="276" r:id="rId5"/>
+    <p:sldId id="277" r:id="rId6"/>
+    <p:sldId id="260" r:id="rId7"/>
+    <p:sldId id="261" r:id="rId8"/>
+    <p:sldId id="259" r:id="rId9"/>
+    <p:sldId id="262" r:id="rId10"/>
+    <p:sldId id="269" r:id="rId11"/>
+    <p:sldId id="271" r:id="rId12"/>
+    <p:sldId id="272" r:id="rId13"/>
+    <p:sldId id="263" r:id="rId14"/>
+    <p:sldId id="264" r:id="rId15"/>
+    <p:sldId id="265" r:id="rId16"/>
+    <p:sldId id="275" r:id="rId17"/>
+    <p:sldId id="266" r:id="rId18"/>
+    <p:sldId id="274" r:id="rId19"/>
+    <p:sldId id="267" r:id="rId20"/>
+    <p:sldId id="270" r:id="rId21"/>
+    <p:sldId id="268" r:id="rId22"/>
+    <p:sldId id="273" r:id="rId23"/>
   </p:sldIdLst>
   <p:sldSz cx="12192000" cy="6858000"/>
   <p:notesSz cx="6858000" cy="9144000"/>
@@ -466,7 +468,7 @@
           <a:p>
             <a:fld id="{4DE82A70-5764-42AD-AA4E-C5FC14A955B5}" type="datetimeFigureOut">
               <a:rPr lang="bg-BG" smtClean="0"/>
-              <a:t>24.11.2021 г.</a:t>
+              <a:t>26.11.2021 г.</a:t>
             </a:fld>
             <a:endParaRPr lang="bg-BG"/>
           </a:p>
@@ -1554,7 +1556,7 @@
           <a:p>
             <a:fld id="{4DE82A70-5764-42AD-AA4E-C5FC14A955B5}" type="datetimeFigureOut">
               <a:rPr lang="bg-BG" smtClean="0"/>
-              <a:t>24.11.2021 г.</a:t>
+              <a:t>26.11.2021 г.</a:t>
             </a:fld>
             <a:endParaRPr lang="bg-BG"/>
           </a:p>
@@ -2534,7 +2536,7 @@
           <a:p>
             <a:fld id="{4DE82A70-5764-42AD-AA4E-C5FC14A955B5}" type="datetimeFigureOut">
               <a:rPr lang="bg-BG" smtClean="0"/>
-              <a:t>24.11.2021 г.</a:t>
+              <a:t>26.11.2021 г.</a:t>
             </a:fld>
             <a:endParaRPr lang="bg-BG"/>
           </a:p>
@@ -3668,7 +3670,7 @@
           <a:p>
             <a:fld id="{4DE82A70-5764-42AD-AA4E-C5FC14A955B5}" type="datetimeFigureOut">
               <a:rPr lang="bg-BG" smtClean="0"/>
-              <a:t>24.11.2021 г.</a:t>
+              <a:t>26.11.2021 г.</a:t>
             </a:fld>
             <a:endParaRPr lang="bg-BG"/>
           </a:p>
@@ -4701,7 +4703,7 @@
           <a:p>
             <a:fld id="{4DE82A70-5764-42AD-AA4E-C5FC14A955B5}" type="datetimeFigureOut">
               <a:rPr lang="bg-BG" smtClean="0"/>
-              <a:t>24.11.2021 г.</a:t>
+              <a:t>26.11.2021 г.</a:t>
             </a:fld>
             <a:endParaRPr lang="bg-BG"/>
           </a:p>
@@ -5361,7 +5363,7 @@
           <a:p>
             <a:fld id="{4DE82A70-5764-42AD-AA4E-C5FC14A955B5}" type="datetimeFigureOut">
               <a:rPr lang="bg-BG" smtClean="0"/>
-              <a:t>24.11.2021 г.</a:t>
+              <a:t>26.11.2021 г.</a:t>
             </a:fld>
             <a:endParaRPr lang="bg-BG"/>
           </a:p>
@@ -6222,7 +6224,7 @@
           <a:p>
             <a:fld id="{4DE82A70-5764-42AD-AA4E-C5FC14A955B5}" type="datetimeFigureOut">
               <a:rPr lang="bg-BG" smtClean="0"/>
-              <a:t>24.11.2021 г.</a:t>
+              <a:t>26.11.2021 г.</a:t>
             </a:fld>
             <a:endParaRPr lang="bg-BG"/>
           </a:p>
@@ -6412,7 +6414,7 @@
           <a:p>
             <a:fld id="{4DE82A70-5764-42AD-AA4E-C5FC14A955B5}" type="datetimeFigureOut">
               <a:rPr lang="bg-BG" smtClean="0"/>
-              <a:t>24.11.2021 г.</a:t>
+              <a:t>26.11.2021 г.</a:t>
             </a:fld>
             <a:endParaRPr lang="bg-BG"/>
           </a:p>
@@ -7384,7 +7386,7 @@
           <a:p>
             <a:fld id="{4DE82A70-5764-42AD-AA4E-C5FC14A955B5}" type="datetimeFigureOut">
               <a:rPr lang="bg-BG" smtClean="0"/>
-              <a:t>24.11.2021 г.</a:t>
+              <a:t>26.11.2021 г.</a:t>
             </a:fld>
             <a:endParaRPr lang="bg-BG"/>
           </a:p>
@@ -7595,7 +7597,7 @@
           <a:p>
             <a:fld id="{4DE82A70-5764-42AD-AA4E-C5FC14A955B5}" type="datetimeFigureOut">
               <a:rPr lang="bg-BG" smtClean="0"/>
-              <a:t>24.11.2021 г.</a:t>
+              <a:t>26.11.2021 г.</a:t>
             </a:fld>
             <a:endParaRPr lang="bg-BG"/>
           </a:p>
@@ -8629,7 +8631,7 @@
           <a:p>
             <a:fld id="{4DE82A70-5764-42AD-AA4E-C5FC14A955B5}" type="datetimeFigureOut">
               <a:rPr lang="bg-BG" smtClean="0"/>
-              <a:t>24.11.2021 г.</a:t>
+              <a:t>26.11.2021 г.</a:t>
             </a:fld>
             <a:endParaRPr lang="bg-BG"/>
           </a:p>
@@ -8901,7 +8903,7 @@
           <a:p>
             <a:fld id="{4DE82A70-5764-42AD-AA4E-C5FC14A955B5}" type="datetimeFigureOut">
               <a:rPr lang="bg-BG" smtClean="0"/>
-              <a:t>24.11.2021 г.</a:t>
+              <a:t>26.11.2021 г.</a:t>
             </a:fld>
             <a:endParaRPr lang="bg-BG"/>
           </a:p>
@@ -9311,7 +9313,7 @@
           <a:p>
             <a:fld id="{4DE82A70-5764-42AD-AA4E-C5FC14A955B5}" type="datetimeFigureOut">
               <a:rPr lang="bg-BG" smtClean="0"/>
-              <a:t>24.11.2021 г.</a:t>
+              <a:t>26.11.2021 г.</a:t>
             </a:fld>
             <a:endParaRPr lang="bg-BG"/>
           </a:p>
@@ -9438,7 +9440,7 @@
           <a:p>
             <a:fld id="{4DE82A70-5764-42AD-AA4E-C5FC14A955B5}" type="datetimeFigureOut">
               <a:rPr lang="bg-BG" smtClean="0"/>
-              <a:t>24.11.2021 г.</a:t>
+              <a:t>26.11.2021 г.</a:t>
             </a:fld>
             <a:endParaRPr lang="bg-BG"/>
           </a:p>
@@ -9533,7 +9535,7 @@
           <a:p>
             <a:fld id="{4DE82A70-5764-42AD-AA4E-C5FC14A955B5}" type="datetimeFigureOut">
               <a:rPr lang="bg-BG" smtClean="0"/>
-              <a:t>24.11.2021 г.</a:t>
+              <a:t>26.11.2021 г.</a:t>
             </a:fld>
             <a:endParaRPr lang="bg-BG"/>
           </a:p>
@@ -10614,7 +10616,7 @@
           <a:p>
             <a:fld id="{4DE82A70-5764-42AD-AA4E-C5FC14A955B5}" type="datetimeFigureOut">
               <a:rPr lang="bg-BG" smtClean="0"/>
-              <a:t>24.11.2021 г.</a:t>
+              <a:t>26.11.2021 г.</a:t>
             </a:fld>
             <a:endParaRPr lang="bg-BG"/>
           </a:p>
@@ -11722,7 +11724,7 @@
           <a:p>
             <a:fld id="{4DE82A70-5764-42AD-AA4E-C5FC14A955B5}" type="datetimeFigureOut">
               <a:rPr lang="bg-BG" smtClean="0"/>
-              <a:t>24.11.2021 г.</a:t>
+              <a:t>26.11.2021 г.</a:t>
             </a:fld>
             <a:endParaRPr lang="bg-BG"/>
           </a:p>
@@ -12719,7 +12721,7 @@
           <a:p>
             <a:fld id="{4DE82A70-5764-42AD-AA4E-C5FC14A955B5}" type="datetimeFigureOut">
               <a:rPr lang="bg-BG" smtClean="0"/>
-              <a:t>24.11.2021 г.</a:t>
+              <a:t>26.11.2021 г.</a:t>
             </a:fld>
             <a:endParaRPr lang="bg-BG"/>
           </a:p>
@@ -13294,7 +13296,7 @@
                 <a16:creationId xmlns:a16="http://schemas.microsoft.com/office/drawing/2014/main" id="{D22D1B95-2B54-43E9-85D9-B489F6C5DD0F}"/>
               </a:ext>
               <a:ext uri="{C183D7F6-B498-43B3-948B-1728B52AA6E4}">
-                <adec:decorative xmlns:adec="http://schemas.microsoft.com/office/drawing/2017/decorative" xmlns="" val="1"/>
+                <adec:decorative xmlns="" xmlns:adec="http://schemas.microsoft.com/office/drawing/2017/decorative" val="1"/>
               </a:ext>
             </a:extLst>
           </p:cNvPr>
@@ -13458,7 +13460,7 @@
                 <a16:creationId xmlns:a16="http://schemas.microsoft.com/office/drawing/2014/main" id="{7D0F3F6D-A49D-4406-8D61-1C4F8D792F04}"/>
               </a:ext>
               <a:ext uri="{C183D7F6-B498-43B3-948B-1728B52AA6E4}">
-                <adec:decorative xmlns:adec="http://schemas.microsoft.com/office/drawing/2017/decorative" xmlns="" val="1"/>
+                <adec:decorative xmlns="" xmlns:adec="http://schemas.microsoft.com/office/drawing/2017/decorative" val="1"/>
               </a:ext>
             </a:extLst>
           </p:cNvPr>
@@ -13659,7 +13661,7 @@
                 <a16:creationId xmlns:a16="http://schemas.microsoft.com/office/drawing/2014/main" id="{D953A318-DA8D-4405-9536-D889E45C5E3E}"/>
               </a:ext>
               <a:ext uri="{C183D7F6-B498-43B3-948B-1728B52AA6E4}">
-                <adec:decorative xmlns:adec="http://schemas.microsoft.com/office/drawing/2017/decorative" xmlns="" val="1"/>
+                <adec:decorative xmlns="" xmlns:adec="http://schemas.microsoft.com/office/drawing/2017/decorative" val="1"/>
               </a:ext>
             </a:extLst>
           </p:cNvPr>
@@ -13738,7 +13740,7 @@
                 <a16:creationId xmlns:a16="http://schemas.microsoft.com/office/drawing/2014/main" id="{9E382A3D-2F90-475C-8DF2-F666FEA3425B}"/>
               </a:ext>
               <a:ext uri="{C183D7F6-B498-43B3-948B-1728B52AA6E4}">
-                <adec:decorative xmlns:adec="http://schemas.microsoft.com/office/drawing/2017/decorative" xmlns="" val="1"/>
+                <adec:decorative xmlns="" xmlns:adec="http://schemas.microsoft.com/office/drawing/2017/decorative" val="1"/>
               </a:ext>
             </a:extLst>
           </p:cNvPr>
@@ -14069,6 +14071,337 @@
           <p:cNvPr id="2" name="Заглавие 1">
             <a:extLst>
               <a:ext uri="{FF2B5EF4-FFF2-40B4-BE49-F238E27FC236}">
+                <a16:creationId xmlns:a16="http://schemas.microsoft.com/office/drawing/2014/main" id="{9E1399E8-5983-477C-B6B3-28BE668C9600}"/>
+              </a:ext>
+            </a:extLst>
+          </p:cNvPr>
+          <p:cNvSpPr>
+            <a:spLocks noGrp="1"/>
+          </p:cNvSpPr>
+          <p:nvPr>
+            <p:ph type="title"/>
+          </p:nvPr>
+        </p:nvSpPr>
+        <p:spPr>
+          <a:xfrm>
+            <a:off x="1154955" y="1295400"/>
+            <a:ext cx="2793158" cy="1183849"/>
+          </a:xfrm>
+        </p:spPr>
+        <p:txBody>
+          <a:bodyPr/>
+          <a:lstStyle/>
+          <a:p>
+            <a:r>
+              <a:rPr lang="en-US" dirty="0">
+                <a:latin typeface="Arial" panose="020B0604020202020204" pitchFamily="34" charset="0"/>
+                <a:cs typeface="Arial" panose="020B0604020202020204" pitchFamily="34" charset="0"/>
+              </a:rPr>
+              <a:t>OEE (Overall Equipment Effectiveness)</a:t>
+            </a:r>
+            <a:endParaRPr lang="bg-BG" dirty="0">
+              <a:latin typeface="Arial" panose="020B0604020202020204" pitchFamily="34" charset="0"/>
+              <a:cs typeface="Arial" panose="020B0604020202020204" pitchFamily="34" charset="0"/>
+            </a:endParaRPr>
+          </a:p>
+        </p:txBody>
+      </p:sp>
+      <p:pic>
+        <p:nvPicPr>
+          <p:cNvPr id="6" name="Контейнер за съдържание 5" descr="Картина, която съдържа текст, визитка, екранна снимка&#10;&#10;Описанието е генерирано автоматично">
+            <a:extLst>
+              <a:ext uri="{FF2B5EF4-FFF2-40B4-BE49-F238E27FC236}">
+                <a16:creationId xmlns:a16="http://schemas.microsoft.com/office/drawing/2014/main" id="{9F36048E-3532-4245-BC24-A230CDD3D910}"/>
+              </a:ext>
+            </a:extLst>
+          </p:cNvPr>
+          <p:cNvPicPr>
+            <a:picLocks noGrp="1" noChangeAspect="1"/>
+          </p:cNvPicPr>
+          <p:nvPr>
+            <p:ph idx="1"/>
+          </p:nvPr>
+        </p:nvPicPr>
+        <p:blipFill>
+          <a:blip r:embed="rId2">
+            <a:extLst>
+              <a:ext uri="{28A0092B-C50C-407E-A947-70E740481C1C}">
+                <a14:useLocalDpi xmlns:a14="http://schemas.microsoft.com/office/drawing/2010/main" val="0"/>
+              </a:ext>
+            </a:extLst>
+          </a:blip>
+          <a:stretch>
+            <a:fillRect/>
+          </a:stretch>
+        </p:blipFill>
+        <p:spPr>
+          <a:xfrm>
+            <a:off x="5513573" y="776813"/>
+            <a:ext cx="4761472" cy="2749750"/>
+          </a:xfrm>
+        </p:spPr>
+      </p:pic>
+      <p:sp>
+        <p:nvSpPr>
+          <p:cNvPr id="4" name="Текстов контейнер 3">
+            <a:extLst>
+              <a:ext uri="{FF2B5EF4-FFF2-40B4-BE49-F238E27FC236}">
+                <a16:creationId xmlns:a16="http://schemas.microsoft.com/office/drawing/2014/main" id="{91B1919B-592E-4D72-8823-6C23A08318C4}"/>
+              </a:ext>
+            </a:extLst>
+          </p:cNvPr>
+          <p:cNvSpPr>
+            <a:spLocks noGrp="1"/>
+          </p:cNvSpPr>
+          <p:nvPr>
+            <p:ph type="body" sz="half" idx="2"/>
+          </p:nvPr>
+        </p:nvSpPr>
+        <p:spPr>
+          <a:xfrm>
+            <a:off x="1154954" y="2724346"/>
+            <a:ext cx="3275644" cy="2611225"/>
+          </a:xfrm>
+        </p:spPr>
+        <p:txBody>
+          <a:bodyPr>
+            <a:normAutofit/>
+          </a:bodyPr>
+          <a:lstStyle/>
+          <a:p>
+            <a:r>
+              <a:rPr lang="en-US" sz="1800" dirty="0">
+                <a:solidFill>
+                  <a:schemeClr val="bg1"/>
+                </a:solidFill>
+                <a:latin typeface="Arial" panose="020B0604020202020204" pitchFamily="34" charset="0"/>
+                <a:cs typeface="Arial" panose="020B0604020202020204" pitchFamily="34" charset="0"/>
+              </a:rPr>
+              <a:t>It’s a gold standard for measuring manufacturing productivity.</a:t>
+            </a:r>
+          </a:p>
+          <a:p>
+            <a:r>
+              <a:rPr lang="en-US" sz="1800" dirty="0">
+                <a:solidFill>
+                  <a:schemeClr val="bg1"/>
+                </a:solidFill>
+                <a:latin typeface="Arial" panose="020B0604020202020204" pitchFamily="34" charset="0"/>
+                <a:cs typeface="Arial" panose="020B0604020202020204" pitchFamily="34" charset="0"/>
+              </a:rPr>
+              <a:t>By measuring of OEE and the underlying losses, we can get important insights on how to systematically improve our manufacturing process.</a:t>
+            </a:r>
+            <a:endParaRPr lang="bg-BG" sz="1800" dirty="0">
+              <a:solidFill>
+                <a:schemeClr val="bg1"/>
+              </a:solidFill>
+              <a:latin typeface="Arial" panose="020B0604020202020204" pitchFamily="34" charset="0"/>
+              <a:cs typeface="Arial" panose="020B0604020202020204" pitchFamily="34" charset="0"/>
+            </a:endParaRPr>
+          </a:p>
+        </p:txBody>
+      </p:sp>
+      <p:pic>
+        <p:nvPicPr>
+          <p:cNvPr id="8" name="Картина 7">
+            <a:extLst>
+              <a:ext uri="{FF2B5EF4-FFF2-40B4-BE49-F238E27FC236}">
+                <a16:creationId xmlns:a16="http://schemas.microsoft.com/office/drawing/2014/main" id="{CB240A52-C317-4489-B730-676821015F8A}"/>
+              </a:ext>
+            </a:extLst>
+          </p:cNvPr>
+          <p:cNvPicPr>
+            <a:picLocks noChangeAspect="1"/>
+          </p:cNvPicPr>
+          <p:nvPr/>
+        </p:nvPicPr>
+        <p:blipFill>
+          <a:blip r:embed="rId3" cstate="hqprint">
+            <a:extLst>
+              <a:ext uri="{28A0092B-C50C-407E-A947-70E740481C1C}">
+                <a14:useLocalDpi xmlns:a14="http://schemas.microsoft.com/office/drawing/2010/main" val="0"/>
+              </a:ext>
+            </a:extLst>
+          </a:blip>
+          <a:stretch>
+            <a:fillRect/>
+          </a:stretch>
+        </p:blipFill>
+        <p:spPr>
+          <a:xfrm>
+            <a:off x="5596506" y="3668803"/>
+            <a:ext cx="4595605" cy="2585028"/>
+          </a:xfrm>
+          <a:prstGeom prst="rect">
+            <a:avLst/>
+          </a:prstGeom>
+        </p:spPr>
+      </p:pic>
+    </p:spTree>
+    <p:extLst>
+      <p:ext uri="{BB962C8B-B14F-4D97-AF65-F5344CB8AC3E}">
+        <p14:creationId xmlns:p14="http://schemas.microsoft.com/office/powerpoint/2010/main" val="2952636599"/>
+      </p:ext>
+    </p:extLst>
+  </p:cSld>
+  <p:clrMapOvr>
+    <a:masterClrMapping/>
+  </p:clrMapOvr>
+</p:sld>
+</file>
+
+<file path=ppt/slides/slide11.xml><?xml version="1.0" encoding="utf-8"?>
+<p:sld xmlns:a="http://schemas.openxmlformats.org/drawingml/2006/main" xmlns:r="http://schemas.openxmlformats.org/officeDocument/2006/relationships" xmlns:p="http://schemas.openxmlformats.org/presentationml/2006/main">
+  <p:cSld>
+    <p:spTree>
+      <p:nvGrpSpPr>
+        <p:cNvPr id="1" name=""/>
+        <p:cNvGrpSpPr/>
+        <p:nvPr/>
+      </p:nvGrpSpPr>
+      <p:grpSpPr>
+        <a:xfrm>
+          <a:off x="0" y="0"/>
+          <a:ext cx="0" cy="0"/>
+          <a:chOff x="0" y="0"/>
+          <a:chExt cx="0" cy="0"/>
+        </a:xfrm>
+      </p:grpSpPr>
+      <p:sp>
+        <p:nvSpPr>
+          <p:cNvPr id="2" name="Заглавие 1">
+            <a:extLst>
+              <a:ext uri="{FF2B5EF4-FFF2-40B4-BE49-F238E27FC236}">
+                <a16:creationId xmlns:a16="http://schemas.microsoft.com/office/drawing/2014/main" id="{43317B4A-D21E-4C75-A6E2-27AADB395689}"/>
+              </a:ext>
+            </a:extLst>
+          </p:cNvPr>
+          <p:cNvSpPr>
+            <a:spLocks noGrp="1"/>
+          </p:cNvSpPr>
+          <p:nvPr>
+            <p:ph type="title"/>
+          </p:nvPr>
+        </p:nvSpPr>
+        <p:spPr/>
+        <p:txBody>
+          <a:bodyPr/>
+          <a:lstStyle/>
+          <a:p>
+            <a:pPr algn="ctr"/>
+            <a:r>
+              <a:rPr lang="en-US" dirty="0">
+                <a:latin typeface="Arial" panose="020B0604020202020204" pitchFamily="34" charset="0"/>
+                <a:cs typeface="Arial" panose="020B0604020202020204" pitchFamily="34" charset="0"/>
+              </a:rPr>
+              <a:t>Smart manufacture</a:t>
+            </a:r>
+            <a:endParaRPr lang="bg-BG" dirty="0">
+              <a:latin typeface="Arial" panose="020B0604020202020204" pitchFamily="34" charset="0"/>
+              <a:cs typeface="Arial" panose="020B0604020202020204" pitchFamily="34" charset="0"/>
+            </a:endParaRPr>
+          </a:p>
+        </p:txBody>
+      </p:sp>
+      <p:pic>
+        <p:nvPicPr>
+          <p:cNvPr id="5" name="Контейнер за съдържание 4">
+            <a:extLst>
+              <a:ext uri="{FF2B5EF4-FFF2-40B4-BE49-F238E27FC236}">
+                <a16:creationId xmlns:a16="http://schemas.microsoft.com/office/drawing/2014/main" id="{50B7D79F-1C0B-4D25-A726-841BCBF5948F}"/>
+              </a:ext>
+            </a:extLst>
+          </p:cNvPr>
+          <p:cNvPicPr>
+            <a:picLocks noGrp="1" noChangeAspect="1"/>
+          </p:cNvPicPr>
+          <p:nvPr>
+            <p:ph idx="1"/>
+          </p:nvPr>
+        </p:nvPicPr>
+        <p:blipFill>
+          <a:blip r:embed="rId2">
+            <a:extLst>
+              <a:ext uri="{28A0092B-C50C-407E-A947-70E740481C1C}">
+                <a14:useLocalDpi xmlns:a14="http://schemas.microsoft.com/office/drawing/2010/main" val="0"/>
+              </a:ext>
+            </a:extLst>
+          </a:blip>
+          <a:stretch>
+            <a:fillRect/>
+          </a:stretch>
+        </p:blipFill>
+        <p:spPr>
+          <a:xfrm>
+            <a:off x="2468881" y="2501900"/>
+            <a:ext cx="6990910" cy="3930468"/>
+          </a:xfrm>
+          <a:prstGeom prst="roundRect">
+            <a:avLst>
+              <a:gd name="adj" fmla="val 4167"/>
+            </a:avLst>
+          </a:prstGeom>
+          <a:solidFill>
+            <a:srgbClr val="FFFFFF"/>
+          </a:solidFill>
+          <a:ln w="76200" cap="sq">
+            <a:solidFill>
+              <a:srgbClr val="EAEAEA"/>
+            </a:solidFill>
+            <a:miter lim="800000"/>
+          </a:ln>
+          <a:effectLst>
+            <a:reflection blurRad="12700" stA="33000" endPos="28000" dist="5000" dir="5400000" sy="-100000" algn="bl" rotWithShape="0"/>
+          </a:effectLst>
+          <a:scene3d>
+            <a:camera prst="orthographicFront"/>
+            <a:lightRig rig="threePt" dir="t">
+              <a:rot lat="0" lon="0" rev="2700000"/>
+            </a:lightRig>
+          </a:scene3d>
+          <a:sp3d contourW="6350">
+            <a:bevelT h="38100"/>
+            <a:contourClr>
+              <a:srgbClr val="C0C0C0"/>
+            </a:contourClr>
+          </a:sp3d>
+        </p:spPr>
+      </p:pic>
+    </p:spTree>
+    <p:extLst>
+      <p:ext uri="{BB962C8B-B14F-4D97-AF65-F5344CB8AC3E}">
+        <p14:creationId xmlns:p14="http://schemas.microsoft.com/office/powerpoint/2010/main" val="1220923656"/>
+      </p:ext>
+    </p:extLst>
+  </p:cSld>
+  <p:clrMapOvr>
+    <a:masterClrMapping/>
+  </p:clrMapOvr>
+</p:sld>
+</file>
+
+<file path=ppt/slides/slide12.xml><?xml version="1.0" encoding="utf-8"?>
+<p:sld xmlns:a="http://schemas.openxmlformats.org/drawingml/2006/main" xmlns:r="http://schemas.openxmlformats.org/officeDocument/2006/relationships" xmlns:p="http://schemas.openxmlformats.org/presentationml/2006/main">
+  <p:cSld>
+    <p:spTree>
+      <p:nvGrpSpPr>
+        <p:cNvPr id="1" name=""/>
+        <p:cNvGrpSpPr/>
+        <p:nvPr/>
+      </p:nvGrpSpPr>
+      <p:grpSpPr>
+        <a:xfrm>
+          <a:off x="0" y="0"/>
+          <a:ext cx="0" cy="0"/>
+          <a:chOff x="0" y="0"/>
+          <a:chExt cx="0" cy="0"/>
+        </a:xfrm>
+      </p:grpSpPr>
+      <p:sp>
+        <p:nvSpPr>
+          <p:cNvPr id="2" name="Заглавие 1">
+            <a:extLst>
+              <a:ext uri="{FF2B5EF4-FFF2-40B4-BE49-F238E27FC236}">
                 <a16:creationId xmlns:a16="http://schemas.microsoft.com/office/drawing/2014/main" id="{AEB9108C-3255-495A-834E-A5961A181A0A}"/>
               </a:ext>
             </a:extLst>
@@ -14304,7 +14637,7 @@
 </p:sld>
 </file>
 
-<file path=ppt/slides/slide11.xml><?xml version="1.0" encoding="utf-8"?>
+<file path=ppt/slides/slide13.xml><?xml version="1.0" encoding="utf-8"?>
 <p:sld xmlns:a="http://schemas.openxmlformats.org/drawingml/2006/main" xmlns:r="http://schemas.openxmlformats.org/officeDocument/2006/relationships" xmlns:p="http://schemas.openxmlformats.org/presentationml/2006/main">
   <p:cSld>
     <p:spTree>
@@ -14658,7 +14991,7 @@
 </p:sld>
 </file>
 
-<file path=ppt/slides/slide12.xml><?xml version="1.0" encoding="utf-8"?>
+<file path=ppt/slides/slide14.xml><?xml version="1.0" encoding="utf-8"?>
 <p:sld xmlns:a="http://schemas.openxmlformats.org/drawingml/2006/main" xmlns:r="http://schemas.openxmlformats.org/officeDocument/2006/relationships" xmlns:p="http://schemas.openxmlformats.org/presentationml/2006/main">
   <p:cSld>
     <p:spTree>
@@ -15516,7 +15849,7 @@
 </p:sld>
 </file>
 
-<file path=ppt/slides/slide13.xml><?xml version="1.0" encoding="utf-8"?>
+<file path=ppt/slides/slide15.xml><?xml version="1.0" encoding="utf-8"?>
 <p:sld xmlns:a="http://schemas.openxmlformats.org/drawingml/2006/main" xmlns:r="http://schemas.openxmlformats.org/officeDocument/2006/relationships" xmlns:p="http://schemas.openxmlformats.org/presentationml/2006/main">
   <p:cSld>
     <p:spTree>
@@ -15617,7 +15950,7 @@
 </p:sld>
 </file>
 
-<file path=ppt/slides/slide14.xml><?xml version="1.0" encoding="utf-8"?>
+<file path=ppt/slides/slide16.xml><?xml version="1.0" encoding="utf-8"?>
 <p:sld xmlns:a="http://schemas.openxmlformats.org/drawingml/2006/main" xmlns:r="http://schemas.openxmlformats.org/officeDocument/2006/relationships" xmlns:p="http://schemas.openxmlformats.org/presentationml/2006/main">
   <p:cSld>
     <p:spTree>
@@ -15771,7 +16104,7 @@
 </p:sld>
 </file>
 
-<file path=ppt/slides/slide15.xml><?xml version="1.0" encoding="utf-8"?>
+<file path=ppt/slides/slide17.xml><?xml version="1.0" encoding="utf-8"?>
 <p:sld xmlns:a="http://schemas.openxmlformats.org/drawingml/2006/main" xmlns:r="http://schemas.openxmlformats.org/officeDocument/2006/relationships" xmlns:p="http://schemas.openxmlformats.org/presentationml/2006/main">
   <p:cSld>
     <p:spTree>
@@ -15901,7 +16234,7 @@
 </p:sld>
 </file>
 
-<file path=ppt/slides/slide16.xml><?xml version="1.0" encoding="utf-8"?>
+<file path=ppt/slides/slide18.xml><?xml version="1.0" encoding="utf-8"?>
 <p:sld xmlns:a="http://schemas.openxmlformats.org/drawingml/2006/main" xmlns:r="http://schemas.openxmlformats.org/officeDocument/2006/relationships" xmlns:p="http://schemas.openxmlformats.org/presentationml/2006/main">
   <p:cSld>
     <p:spTree>
@@ -16135,7 +16468,7 @@
 </p:sld>
 </file>
 
-<file path=ppt/slides/slide17.xml><?xml version="1.0" encoding="utf-8"?>
+<file path=ppt/slides/slide19.xml><?xml version="1.0" encoding="utf-8"?>
 <p:sld xmlns:a="http://schemas.openxmlformats.org/drawingml/2006/main" xmlns:r="http://schemas.openxmlformats.org/officeDocument/2006/relationships" xmlns:p="http://schemas.openxmlformats.org/presentationml/2006/main">
   <p:cSld>
     <p:spTree>
@@ -16855,832 +17188,6 @@
     <p:extLst>
       <p:ext uri="{BB962C8B-B14F-4D97-AF65-F5344CB8AC3E}">
         <p14:creationId xmlns:p14="http://schemas.microsoft.com/office/powerpoint/2010/main" val="3539581258"/>
-      </p:ext>
-    </p:extLst>
-  </p:cSld>
-  <p:clrMapOvr>
-    <a:masterClrMapping/>
-  </p:clrMapOvr>
-</p:sld>
-</file>
-
-<file path=ppt/slides/slide18.xml><?xml version="1.0" encoding="utf-8"?>
-<p:sld xmlns:a="http://schemas.openxmlformats.org/drawingml/2006/main" xmlns:r="http://schemas.openxmlformats.org/officeDocument/2006/relationships" xmlns:p="http://schemas.openxmlformats.org/presentationml/2006/main">
-  <p:cSld>
-    <p:spTree>
-      <p:nvGrpSpPr>
-        <p:cNvPr id="1" name=""/>
-        <p:cNvGrpSpPr/>
-        <p:nvPr/>
-      </p:nvGrpSpPr>
-      <p:grpSpPr>
-        <a:xfrm>
-          <a:off x="0" y="0"/>
-          <a:ext cx="0" cy="0"/>
-          <a:chOff x="0" y="0"/>
-          <a:chExt cx="0" cy="0"/>
-        </a:xfrm>
-      </p:grpSpPr>
-      <p:sp>
-        <p:nvSpPr>
-          <p:cNvPr id="2" name="Заглавие 1">
-            <a:extLst>
-              <a:ext uri="{FF2B5EF4-FFF2-40B4-BE49-F238E27FC236}">
-                <a16:creationId xmlns:a16="http://schemas.microsoft.com/office/drawing/2014/main" id="{DA312324-62E5-4F74-BADC-A6E6208D8789}"/>
-              </a:ext>
-            </a:extLst>
-          </p:cNvPr>
-          <p:cNvSpPr>
-            <a:spLocks noGrp="1"/>
-          </p:cNvSpPr>
-          <p:nvPr>
-            <p:ph type="title"/>
-          </p:nvPr>
-        </p:nvSpPr>
-        <p:spPr>
-          <a:xfrm>
-            <a:off x="1154955" y="1295400"/>
-            <a:ext cx="2793158" cy="967033"/>
-          </a:xfrm>
-        </p:spPr>
-        <p:txBody>
-          <a:bodyPr/>
-          <a:lstStyle/>
-          <a:p>
-            <a:pPr algn="ctr"/>
-            <a:r>
-              <a:rPr lang="en-US" dirty="0">
-                <a:latin typeface="Arial" panose="020B0604020202020204" pitchFamily="34" charset="0"/>
-                <a:cs typeface="Arial" panose="020B0604020202020204" pitchFamily="34" charset="0"/>
-              </a:rPr>
-              <a:t>Komax Connect Project</a:t>
-            </a:r>
-            <a:endParaRPr lang="bg-BG" dirty="0">
-              <a:latin typeface="Arial" panose="020B0604020202020204" pitchFamily="34" charset="0"/>
-              <a:cs typeface="Arial" panose="020B0604020202020204" pitchFamily="34" charset="0"/>
-            </a:endParaRPr>
-          </a:p>
-        </p:txBody>
-      </p:sp>
-      <p:pic>
-        <p:nvPicPr>
-          <p:cNvPr id="25" name="Контейнер за съдържание 24">
-            <a:extLst>
-              <a:ext uri="{FF2B5EF4-FFF2-40B4-BE49-F238E27FC236}">
-                <a16:creationId xmlns:a16="http://schemas.microsoft.com/office/drawing/2014/main" id="{D593F352-3381-497A-918A-13E4DA2369A8}"/>
-              </a:ext>
-            </a:extLst>
-          </p:cNvPr>
-          <p:cNvPicPr>
-            <a:picLocks noGrp="1" noChangeAspect="1"/>
-          </p:cNvPicPr>
-          <p:nvPr>
-            <p:ph idx="1"/>
-          </p:nvPr>
-        </p:nvPicPr>
-        <p:blipFill>
-          <a:blip r:embed="rId2">
-            <a:extLst>
-              <a:ext uri="{28A0092B-C50C-407E-A947-70E740481C1C}">
-                <a14:useLocalDpi xmlns:a14="http://schemas.microsoft.com/office/drawing/2010/main" val="0"/>
-              </a:ext>
-            </a:extLst>
-          </a:blip>
-          <a:stretch>
-            <a:fillRect/>
-          </a:stretch>
-        </p:blipFill>
-        <p:spPr>
-          <a:xfrm>
-            <a:off x="5518388" y="2337610"/>
-            <a:ext cx="6112887" cy="2701251"/>
-          </a:xfrm>
-        </p:spPr>
-      </p:pic>
-      <p:sp>
-        <p:nvSpPr>
-          <p:cNvPr id="4" name="Текстов контейнер 3">
-            <a:extLst>
-              <a:ext uri="{FF2B5EF4-FFF2-40B4-BE49-F238E27FC236}">
-                <a16:creationId xmlns:a16="http://schemas.microsoft.com/office/drawing/2014/main" id="{1590427F-5578-45C5-846B-BA827311EFE3}"/>
-              </a:ext>
-            </a:extLst>
-          </p:cNvPr>
-          <p:cNvSpPr>
-            <a:spLocks noGrp="1"/>
-          </p:cNvSpPr>
-          <p:nvPr>
-            <p:ph type="body" sz="half" idx="2"/>
-          </p:nvPr>
-        </p:nvSpPr>
-        <p:spPr>
-          <a:xfrm>
-            <a:off x="1154954" y="2582944"/>
-            <a:ext cx="3162522" cy="3441935"/>
-          </a:xfrm>
-        </p:spPr>
-        <p:txBody>
-          <a:bodyPr>
-            <a:noAutofit/>
-          </a:bodyPr>
-          <a:lstStyle/>
-          <a:p>
-            <a:r>
-              <a:rPr lang="en-US" sz="1600" dirty="0">
-                <a:solidFill>
-                  <a:schemeClr val="bg1"/>
-                </a:solidFill>
-                <a:latin typeface="Arial" panose="020B0604020202020204" pitchFamily="34" charset="0"/>
-                <a:cs typeface="Arial" panose="020B0604020202020204" pitchFamily="34" charset="0"/>
-              </a:rPr>
-              <a:t>We already have an initial  connection between CS WIN and the cloud KOMAX system.</a:t>
-            </a:r>
-          </a:p>
-          <a:p>
-            <a:r>
-              <a:rPr lang="en-US" sz="1600" dirty="0">
-                <a:solidFill>
-                  <a:schemeClr val="bg1"/>
-                </a:solidFill>
-                <a:latin typeface="Arial" panose="020B0604020202020204" pitchFamily="34" charset="0"/>
-                <a:cs typeface="Arial" panose="020B0604020202020204" pitchFamily="34" charset="0"/>
-              </a:rPr>
-              <a:t>For this purpose were developed CS WIN COM object which serves as a OPC UA client and OPC UA server which is a Windows service app that running on the same PC.</a:t>
-            </a:r>
-          </a:p>
-        </p:txBody>
-      </p:sp>
-    </p:spTree>
-    <p:extLst>
-      <p:ext uri="{BB962C8B-B14F-4D97-AF65-F5344CB8AC3E}">
-        <p14:creationId xmlns:p14="http://schemas.microsoft.com/office/powerpoint/2010/main" val="2705067992"/>
-      </p:ext>
-    </p:extLst>
-  </p:cSld>
-  <p:clrMapOvr>
-    <a:masterClrMapping/>
-  </p:clrMapOvr>
-</p:sld>
-</file>
-
-<file path=ppt/slides/slide19.xml><?xml version="1.0" encoding="utf-8"?>
-<p:sld xmlns:a="http://schemas.openxmlformats.org/drawingml/2006/main" xmlns:r="http://schemas.openxmlformats.org/officeDocument/2006/relationships" xmlns:p="http://schemas.openxmlformats.org/presentationml/2006/main">
-  <p:cSld>
-    <p:spTree>
-      <p:nvGrpSpPr>
-        <p:cNvPr id="1" name=""/>
-        <p:cNvGrpSpPr/>
-        <p:nvPr/>
-      </p:nvGrpSpPr>
-      <p:grpSpPr>
-        <a:xfrm>
-          <a:off x="0" y="0"/>
-          <a:ext cx="0" cy="0"/>
-          <a:chOff x="0" y="0"/>
-          <a:chExt cx="0" cy="0"/>
-        </a:xfrm>
-      </p:grpSpPr>
-      <p:sp>
-        <p:nvSpPr>
-          <p:cNvPr id="2" name="Title 1"/>
-          <p:cNvSpPr>
-            <a:spLocks noGrp="1"/>
-          </p:cNvSpPr>
-          <p:nvPr>
-            <p:ph type="title"/>
-          </p:nvPr>
-        </p:nvSpPr>
-        <p:spPr/>
-        <p:txBody>
-          <a:bodyPr/>
-          <a:lstStyle/>
-          <a:p>
-            <a:pPr algn="ctr"/>
-            <a:r>
-              <a:rPr lang="en-US" dirty="0">
-                <a:latin typeface="Arial" panose="020B0604020202020204" pitchFamily="34" charset="0"/>
-                <a:cs typeface="Arial" panose="020B0604020202020204" pitchFamily="34" charset="0"/>
-              </a:rPr>
-              <a:t>KOMAX Connect Project (demo)</a:t>
-            </a:r>
-          </a:p>
-        </p:txBody>
-      </p:sp>
-      <p:pic>
-        <p:nvPicPr>
-          <p:cNvPr id="4" name="Контейнер за съдържание 9">
-            <a:extLst>
-              <a:ext uri="{FF2B5EF4-FFF2-40B4-BE49-F238E27FC236}">
-                <a16:creationId xmlns:a16="http://schemas.microsoft.com/office/drawing/2014/main" id="{C0DD5992-5E6D-4267-87DF-67E399EB88BA}"/>
-              </a:ext>
-            </a:extLst>
-          </p:cNvPr>
-          <p:cNvPicPr>
-            <a:picLocks noGrp="1" noChangeAspect="1"/>
-          </p:cNvPicPr>
-          <p:nvPr>
-            <p:ph idx="1"/>
-          </p:nvPr>
-        </p:nvPicPr>
-        <p:blipFill>
-          <a:blip r:embed="rId2" cstate="hqprint">
-            <a:extLst>
-              <a:ext uri="{28A0092B-C50C-407E-A947-70E740481C1C}">
-                <a14:useLocalDpi xmlns:a14="http://schemas.microsoft.com/office/drawing/2010/main" val="0"/>
-              </a:ext>
-            </a:extLst>
-          </a:blip>
-          <a:stretch>
-            <a:fillRect/>
-          </a:stretch>
-        </p:blipFill>
-        <p:spPr>
-          <a:xfrm>
-            <a:off x="518728" y="4243705"/>
-            <a:ext cx="936576" cy="817426"/>
-          </a:xfrm>
-          <a:prstGeom prst="rect">
-            <a:avLst/>
-          </a:prstGeom>
-        </p:spPr>
-      </p:pic>
-      <p:pic>
-        <p:nvPicPr>
-          <p:cNvPr id="5" name="Picture 4"/>
-          <p:cNvPicPr>
-            <a:picLocks noChangeAspect="1"/>
-          </p:cNvPicPr>
-          <p:nvPr/>
-        </p:nvPicPr>
-        <p:blipFill>
-          <a:blip r:embed="rId3">
-            <a:extLst>
-              <a:ext uri="{28A0092B-C50C-407E-A947-70E740481C1C}">
-                <a14:useLocalDpi xmlns:a14="http://schemas.microsoft.com/office/drawing/2010/main" val="0"/>
-              </a:ext>
-            </a:extLst>
-          </a:blip>
-          <a:stretch>
-            <a:fillRect/>
-          </a:stretch>
-        </p:blipFill>
-        <p:spPr>
-          <a:xfrm>
-            <a:off x="9390613" y="4054358"/>
-            <a:ext cx="1564248" cy="1018449"/>
-          </a:xfrm>
-          <a:prstGeom prst="rect">
-            <a:avLst/>
-          </a:prstGeom>
-        </p:spPr>
-      </p:pic>
-      <p:pic>
-        <p:nvPicPr>
-          <p:cNvPr id="6" name="Picture 5"/>
-          <p:cNvPicPr>
-            <a:picLocks noChangeAspect="1"/>
-          </p:cNvPicPr>
-          <p:nvPr/>
-        </p:nvPicPr>
-        <p:blipFill>
-          <a:blip r:embed="rId4">
-            <a:extLst>
-              <a:ext uri="{28A0092B-C50C-407E-A947-70E740481C1C}">
-                <a14:useLocalDpi xmlns:a14="http://schemas.microsoft.com/office/drawing/2010/main" val="0"/>
-              </a:ext>
-            </a:extLst>
-          </a:blip>
-          <a:stretch>
-            <a:fillRect/>
-          </a:stretch>
-        </p:blipFill>
-        <p:spPr>
-          <a:xfrm>
-            <a:off x="4041822" y="4257786"/>
-            <a:ext cx="801737" cy="777122"/>
-          </a:xfrm>
-          <a:prstGeom prst="rect">
-            <a:avLst/>
-          </a:prstGeom>
-        </p:spPr>
-      </p:pic>
-      <p:sp>
-        <p:nvSpPr>
-          <p:cNvPr id="9" name="Текстово поле 17">
-            <a:extLst>
-              <a:ext uri="{FF2B5EF4-FFF2-40B4-BE49-F238E27FC236}">
-                <a16:creationId xmlns:a16="http://schemas.microsoft.com/office/drawing/2014/main" id="{7F5DDDB3-3F24-48C7-B9CA-C8D03CAB82D2}"/>
-              </a:ext>
-            </a:extLst>
-          </p:cNvPr>
-          <p:cNvSpPr txBox="1"/>
-          <p:nvPr/>
-        </p:nvSpPr>
-        <p:spPr>
-          <a:xfrm>
-            <a:off x="3897746" y="3734566"/>
-            <a:ext cx="1483351" cy="523220"/>
-          </a:xfrm>
-          <a:prstGeom prst="rect">
-            <a:avLst/>
-          </a:prstGeom>
-          <a:noFill/>
-        </p:spPr>
-        <p:txBody>
-          <a:bodyPr wrap="square" rtlCol="0">
-            <a:spAutoFit/>
-          </a:bodyPr>
-          <a:lstStyle/>
-          <a:p>
-            <a:r>
-              <a:rPr lang="en-US" sz="1400" dirty="0">
-                <a:latin typeface="Arial" panose="020B0604020202020204" pitchFamily="34" charset="0"/>
-                <a:cs typeface="Arial" panose="020B0604020202020204" pitchFamily="34" charset="0"/>
-              </a:rPr>
-              <a:t>OPC UA server (Win service)</a:t>
-            </a:r>
-            <a:endParaRPr lang="bg-BG" sz="1400" dirty="0">
-              <a:latin typeface="Arial" panose="020B0604020202020204" pitchFamily="34" charset="0"/>
-              <a:cs typeface="Arial" panose="020B0604020202020204" pitchFamily="34" charset="0"/>
-            </a:endParaRPr>
-          </a:p>
-        </p:txBody>
-      </p:sp>
-      <p:cxnSp>
-        <p:nvCxnSpPr>
-          <p:cNvPr id="10" name="Съединител &quot;права стрелка&quot; 10">
-            <a:extLst>
-              <a:ext uri="{FF2B5EF4-FFF2-40B4-BE49-F238E27FC236}">
-                <a16:creationId xmlns:a16="http://schemas.microsoft.com/office/drawing/2014/main" id="{7928FC36-829C-421E-9AB1-B7301E06C832}"/>
-              </a:ext>
-            </a:extLst>
-          </p:cNvPr>
-          <p:cNvCxnSpPr>
-            <a:cxnSpLocks/>
-          </p:cNvCxnSpPr>
-          <p:nvPr/>
-        </p:nvCxnSpPr>
-        <p:spPr>
-          <a:xfrm flipV="1">
-            <a:off x="1542569" y="4640006"/>
-            <a:ext cx="2347792" cy="12682"/>
-          </a:xfrm>
-          <a:prstGeom prst="straightConnector1">
-            <a:avLst/>
-          </a:prstGeom>
-          <a:ln>
-            <a:tailEnd type="triangle"/>
-          </a:ln>
-        </p:spPr>
-        <p:style>
-          <a:lnRef idx="1">
-            <a:schemeClr val="dk1"/>
-          </a:lnRef>
-          <a:fillRef idx="0">
-            <a:schemeClr val="dk1"/>
-          </a:fillRef>
-          <a:effectRef idx="0">
-            <a:schemeClr val="dk1"/>
-          </a:effectRef>
-          <a:fontRef idx="minor">
-            <a:schemeClr val="tx1"/>
-          </a:fontRef>
-        </p:style>
-      </p:cxnSp>
-      <p:sp>
-        <p:nvSpPr>
-          <p:cNvPr id="13" name="Текстово поле 17">
-            <a:extLst>
-              <a:ext uri="{FF2B5EF4-FFF2-40B4-BE49-F238E27FC236}">
-                <a16:creationId xmlns:a16="http://schemas.microsoft.com/office/drawing/2014/main" id="{7F5DDDB3-3F24-48C7-B9CA-C8D03CAB82D2}"/>
-              </a:ext>
-            </a:extLst>
-          </p:cNvPr>
-          <p:cNvSpPr txBox="1"/>
-          <p:nvPr/>
-        </p:nvSpPr>
-        <p:spPr>
-          <a:xfrm>
-            <a:off x="332925" y="3448319"/>
-            <a:ext cx="1410390" cy="738664"/>
-          </a:xfrm>
-          <a:prstGeom prst="rect">
-            <a:avLst/>
-          </a:prstGeom>
-          <a:noFill/>
-        </p:spPr>
-        <p:txBody>
-          <a:bodyPr wrap="square" rtlCol="0">
-            <a:spAutoFit/>
-          </a:bodyPr>
-          <a:lstStyle/>
-          <a:p>
-            <a:r>
-              <a:rPr lang="en-US" sz="1400" dirty="0">
-                <a:latin typeface="Arial" panose="020B0604020202020204" pitchFamily="34" charset="0"/>
-                <a:cs typeface="Arial" panose="020B0604020202020204" pitchFamily="34" charset="0"/>
-              </a:rPr>
-              <a:t>CS WIN </a:t>
-            </a:r>
-          </a:p>
-          <a:p>
-            <a:r>
-              <a:rPr lang="en-US" sz="1400" dirty="0">
-                <a:latin typeface="Arial" panose="020B0604020202020204" pitchFamily="34" charset="0"/>
-                <a:cs typeface="Arial" panose="020B0604020202020204" pitchFamily="34" charset="0"/>
-              </a:rPr>
-              <a:t>(OPC UA client</a:t>
-            </a:r>
-          </a:p>
-          <a:p>
-            <a:r>
-              <a:rPr lang="en-US" sz="1400" dirty="0">
-                <a:latin typeface="Arial" panose="020B0604020202020204" pitchFamily="34" charset="0"/>
-                <a:cs typeface="Arial" panose="020B0604020202020204" pitchFamily="34" charset="0"/>
-              </a:rPr>
-              <a:t> – COM object)</a:t>
-            </a:r>
-            <a:endParaRPr lang="bg-BG" sz="1400" dirty="0">
-              <a:latin typeface="Arial" panose="020B0604020202020204" pitchFamily="34" charset="0"/>
-              <a:cs typeface="Arial" panose="020B0604020202020204" pitchFamily="34" charset="0"/>
-            </a:endParaRPr>
-          </a:p>
-        </p:txBody>
-      </p:sp>
-      <p:pic>
-        <p:nvPicPr>
-          <p:cNvPr id="21" name="Контейнер за съдържание 7">
-            <a:extLst>
-              <a:ext uri="{FF2B5EF4-FFF2-40B4-BE49-F238E27FC236}">
-                <a16:creationId xmlns:a16="http://schemas.microsoft.com/office/drawing/2014/main" id="{E0C74E10-020B-46E3-AFAC-3A0647E97630}"/>
-              </a:ext>
-            </a:extLst>
-          </p:cNvPr>
-          <p:cNvPicPr>
-            <a:picLocks noChangeAspect="1"/>
-          </p:cNvPicPr>
-          <p:nvPr/>
-        </p:nvPicPr>
-        <p:blipFill>
-          <a:blip r:embed="rId5">
-            <a:extLst>
-              <a:ext uri="{28A0092B-C50C-407E-A947-70E740481C1C}">
-                <a14:useLocalDpi xmlns:a14="http://schemas.microsoft.com/office/drawing/2010/main" val="0"/>
-              </a:ext>
-            </a:extLst>
-          </a:blip>
-          <a:stretch>
-            <a:fillRect/>
-          </a:stretch>
-        </p:blipFill>
-        <p:spPr>
-          <a:xfrm>
-            <a:off x="6569439" y="3888839"/>
-            <a:ext cx="1264951" cy="1264951"/>
-          </a:xfrm>
-          <a:prstGeom prst="rect">
-            <a:avLst/>
-          </a:prstGeom>
-        </p:spPr>
-      </p:pic>
-      <p:sp>
-        <p:nvSpPr>
-          <p:cNvPr id="22" name="Текстово поле 17">
-            <a:extLst>
-              <a:ext uri="{FF2B5EF4-FFF2-40B4-BE49-F238E27FC236}">
-                <a16:creationId xmlns:a16="http://schemas.microsoft.com/office/drawing/2014/main" id="{7F5DDDB3-3F24-48C7-B9CA-C8D03CAB82D2}"/>
-              </a:ext>
-            </a:extLst>
-          </p:cNvPr>
-          <p:cNvSpPr txBox="1"/>
-          <p:nvPr/>
-        </p:nvSpPr>
-        <p:spPr>
-          <a:xfrm>
-            <a:off x="6443893" y="3580677"/>
-            <a:ext cx="1599417" cy="307777"/>
-          </a:xfrm>
-          <a:prstGeom prst="rect">
-            <a:avLst/>
-          </a:prstGeom>
-          <a:noFill/>
-        </p:spPr>
-        <p:txBody>
-          <a:bodyPr wrap="square" rtlCol="0">
-            <a:spAutoFit/>
-          </a:bodyPr>
-          <a:lstStyle/>
-          <a:p>
-            <a:r>
-              <a:rPr lang="en-US" sz="1400" dirty="0">
-                <a:latin typeface="Arial" panose="020B0604020202020204" pitchFamily="34" charset="0"/>
-                <a:cs typeface="Arial" panose="020B0604020202020204" pitchFamily="34" charset="0"/>
-              </a:rPr>
-              <a:t>KOMAX Gateway</a:t>
-            </a:r>
-            <a:endParaRPr lang="bg-BG" sz="1400" dirty="0">
-              <a:latin typeface="Arial" panose="020B0604020202020204" pitchFamily="34" charset="0"/>
-              <a:cs typeface="Arial" panose="020B0604020202020204" pitchFamily="34" charset="0"/>
-            </a:endParaRPr>
-          </a:p>
-        </p:txBody>
-      </p:sp>
-      <p:sp>
-        <p:nvSpPr>
-          <p:cNvPr id="23" name="Текстово поле 17">
-            <a:extLst>
-              <a:ext uri="{FF2B5EF4-FFF2-40B4-BE49-F238E27FC236}">
-                <a16:creationId xmlns:a16="http://schemas.microsoft.com/office/drawing/2014/main" id="{7F5DDDB3-3F24-48C7-B9CA-C8D03CAB82D2}"/>
-              </a:ext>
-            </a:extLst>
-          </p:cNvPr>
-          <p:cNvSpPr txBox="1"/>
-          <p:nvPr/>
-        </p:nvSpPr>
-        <p:spPr>
-          <a:xfrm>
-            <a:off x="9317959" y="3663763"/>
-            <a:ext cx="1599417" cy="307777"/>
-          </a:xfrm>
-          <a:prstGeom prst="rect">
-            <a:avLst/>
-          </a:prstGeom>
-          <a:noFill/>
-        </p:spPr>
-        <p:txBody>
-          <a:bodyPr wrap="square" rtlCol="0">
-            <a:spAutoFit/>
-          </a:bodyPr>
-          <a:lstStyle/>
-          <a:p>
-            <a:r>
-              <a:rPr lang="en-US" sz="1400" dirty="0">
-                <a:latin typeface="Arial" panose="020B0604020202020204" pitchFamily="34" charset="0"/>
-                <a:cs typeface="Arial" panose="020B0604020202020204" pitchFamily="34" charset="0"/>
-              </a:rPr>
-              <a:t>Cloud dashboard</a:t>
-            </a:r>
-            <a:endParaRPr lang="bg-BG" sz="1400" dirty="0">
-              <a:latin typeface="Arial" panose="020B0604020202020204" pitchFamily="34" charset="0"/>
-              <a:cs typeface="Arial" panose="020B0604020202020204" pitchFamily="34" charset="0"/>
-            </a:endParaRPr>
-          </a:p>
-        </p:txBody>
-      </p:sp>
-      <p:cxnSp>
-        <p:nvCxnSpPr>
-          <p:cNvPr id="24" name="Съединител &quot;права стрелка&quot; 10">
-            <a:extLst>
-              <a:ext uri="{FF2B5EF4-FFF2-40B4-BE49-F238E27FC236}">
-                <a16:creationId xmlns:a16="http://schemas.microsoft.com/office/drawing/2014/main" id="{7928FC36-829C-421E-9AB1-B7301E06C832}"/>
-              </a:ext>
-            </a:extLst>
-          </p:cNvPr>
-          <p:cNvCxnSpPr>
-            <a:cxnSpLocks/>
-          </p:cNvCxnSpPr>
-          <p:nvPr/>
-        </p:nvCxnSpPr>
-        <p:spPr>
-          <a:xfrm flipV="1">
-            <a:off x="7739955" y="4557240"/>
-            <a:ext cx="1535415" cy="12684"/>
-          </a:xfrm>
-          <a:prstGeom prst="straightConnector1">
-            <a:avLst/>
-          </a:prstGeom>
-          <a:ln>
-            <a:tailEnd type="triangle"/>
-          </a:ln>
-        </p:spPr>
-        <p:style>
-          <a:lnRef idx="1">
-            <a:schemeClr val="dk1"/>
-          </a:lnRef>
-          <a:fillRef idx="0">
-            <a:schemeClr val="dk1"/>
-          </a:fillRef>
-          <a:effectRef idx="0">
-            <a:schemeClr val="dk1"/>
-          </a:effectRef>
-          <a:fontRef idx="minor">
-            <a:schemeClr val="tx1"/>
-          </a:fontRef>
-        </p:style>
-      </p:cxnSp>
-      <p:sp>
-        <p:nvSpPr>
-          <p:cNvPr id="25" name="Текстово поле 17">
-            <a:extLst>
-              <a:ext uri="{FF2B5EF4-FFF2-40B4-BE49-F238E27FC236}">
-                <a16:creationId xmlns:a16="http://schemas.microsoft.com/office/drawing/2014/main" id="{7F5DDDB3-3F24-48C7-B9CA-C8D03CAB82D2}"/>
-              </a:ext>
-            </a:extLst>
-          </p:cNvPr>
-          <p:cNvSpPr txBox="1"/>
-          <p:nvPr/>
-        </p:nvSpPr>
-        <p:spPr>
-          <a:xfrm>
-            <a:off x="1934865" y="4233635"/>
-            <a:ext cx="1599417" cy="307777"/>
-          </a:xfrm>
-          <a:prstGeom prst="rect">
-            <a:avLst/>
-          </a:prstGeom>
-          <a:noFill/>
-        </p:spPr>
-        <p:txBody>
-          <a:bodyPr wrap="square" rtlCol="0">
-            <a:spAutoFit/>
-          </a:bodyPr>
-          <a:lstStyle/>
-          <a:p>
-            <a:r>
-              <a:rPr lang="en-US" sz="1400" dirty="0">
-                <a:latin typeface="Arial" panose="020B0604020202020204" pitchFamily="34" charset="0"/>
-                <a:cs typeface="Arial" panose="020B0604020202020204" pitchFamily="34" charset="0"/>
-              </a:rPr>
-              <a:t>write data</a:t>
-            </a:r>
-            <a:endParaRPr lang="bg-BG" sz="1400" dirty="0">
-              <a:latin typeface="Arial" panose="020B0604020202020204" pitchFamily="34" charset="0"/>
-              <a:cs typeface="Arial" panose="020B0604020202020204" pitchFamily="34" charset="0"/>
-            </a:endParaRPr>
-          </a:p>
-        </p:txBody>
-      </p:sp>
-      <p:cxnSp>
-        <p:nvCxnSpPr>
-          <p:cNvPr id="28" name="Съединител &quot;права стрелка&quot; 10">
-            <a:extLst>
-              <a:ext uri="{FF2B5EF4-FFF2-40B4-BE49-F238E27FC236}">
-                <a16:creationId xmlns:a16="http://schemas.microsoft.com/office/drawing/2014/main" id="{7928FC36-829C-421E-9AB1-B7301E06C832}"/>
-              </a:ext>
-            </a:extLst>
-          </p:cNvPr>
-          <p:cNvCxnSpPr>
-            <a:cxnSpLocks/>
-          </p:cNvCxnSpPr>
-          <p:nvPr/>
-        </p:nvCxnSpPr>
-        <p:spPr>
-          <a:xfrm flipH="1">
-            <a:off x="5018090" y="4605437"/>
-            <a:ext cx="1535416" cy="3430"/>
-          </a:xfrm>
-          <a:prstGeom prst="straightConnector1">
-            <a:avLst/>
-          </a:prstGeom>
-          <a:ln>
-            <a:tailEnd type="triangle"/>
-          </a:ln>
-        </p:spPr>
-        <p:style>
-          <a:lnRef idx="1">
-            <a:schemeClr val="dk1"/>
-          </a:lnRef>
-          <a:fillRef idx="0">
-            <a:schemeClr val="dk1"/>
-          </a:fillRef>
-          <a:effectRef idx="0">
-            <a:schemeClr val="dk1"/>
-          </a:effectRef>
-          <a:fontRef idx="minor">
-            <a:schemeClr val="tx1"/>
-          </a:fontRef>
-        </p:style>
-      </p:cxnSp>
-      <p:sp>
-        <p:nvSpPr>
-          <p:cNvPr id="34" name="Текстово поле 17">
-            <a:extLst>
-              <a:ext uri="{FF2B5EF4-FFF2-40B4-BE49-F238E27FC236}">
-                <a16:creationId xmlns:a16="http://schemas.microsoft.com/office/drawing/2014/main" id="{7F5DDDB3-3F24-48C7-B9CA-C8D03CAB82D2}"/>
-              </a:ext>
-            </a:extLst>
-          </p:cNvPr>
-          <p:cNvSpPr txBox="1"/>
-          <p:nvPr/>
-        </p:nvSpPr>
-        <p:spPr>
-          <a:xfrm>
-            <a:off x="5354951" y="4213538"/>
-            <a:ext cx="1003143" cy="307777"/>
-          </a:xfrm>
-          <a:prstGeom prst="rect">
-            <a:avLst/>
-          </a:prstGeom>
-          <a:noFill/>
-        </p:spPr>
-        <p:txBody>
-          <a:bodyPr wrap="square" rtlCol="0">
-            <a:spAutoFit/>
-          </a:bodyPr>
-          <a:lstStyle/>
-          <a:p>
-            <a:r>
-              <a:rPr lang="en-US" sz="1400" dirty="0">
-                <a:latin typeface="Arial" panose="020B0604020202020204" pitchFamily="34" charset="0"/>
-                <a:cs typeface="Arial" panose="020B0604020202020204" pitchFamily="34" charset="0"/>
-              </a:rPr>
-              <a:t>read data</a:t>
-            </a:r>
-            <a:endParaRPr lang="bg-BG" sz="1400" dirty="0">
-              <a:latin typeface="Arial" panose="020B0604020202020204" pitchFamily="34" charset="0"/>
-              <a:cs typeface="Arial" panose="020B0604020202020204" pitchFamily="34" charset="0"/>
-            </a:endParaRPr>
-          </a:p>
-        </p:txBody>
-      </p:sp>
-      <p:sp>
-        <p:nvSpPr>
-          <p:cNvPr id="35" name="Текстово поле 17">
-            <a:extLst>
-              <a:ext uri="{FF2B5EF4-FFF2-40B4-BE49-F238E27FC236}">
-                <a16:creationId xmlns:a16="http://schemas.microsoft.com/office/drawing/2014/main" id="{7F5DDDB3-3F24-48C7-B9CA-C8D03CAB82D2}"/>
-              </a:ext>
-            </a:extLst>
-          </p:cNvPr>
-          <p:cNvSpPr txBox="1"/>
-          <p:nvPr/>
-        </p:nvSpPr>
-        <p:spPr>
-          <a:xfrm>
-            <a:off x="2115766" y="4706978"/>
-            <a:ext cx="867784" cy="307777"/>
-          </a:xfrm>
-          <a:prstGeom prst="rect">
-            <a:avLst/>
-          </a:prstGeom>
-          <a:noFill/>
-        </p:spPr>
-        <p:txBody>
-          <a:bodyPr wrap="square" rtlCol="0">
-            <a:spAutoFit/>
-          </a:bodyPr>
-          <a:lstStyle/>
-          <a:p>
-            <a:r>
-              <a:rPr lang="en-US" sz="1400" dirty="0">
-                <a:latin typeface="Arial" panose="020B0604020202020204" pitchFamily="34" charset="0"/>
-                <a:cs typeface="Arial" panose="020B0604020202020204" pitchFamily="34" charset="0"/>
-              </a:rPr>
-              <a:t>OPC UA</a:t>
-            </a:r>
-            <a:endParaRPr lang="bg-BG" sz="1400" dirty="0">
-              <a:latin typeface="Arial" panose="020B0604020202020204" pitchFamily="34" charset="0"/>
-              <a:cs typeface="Arial" panose="020B0604020202020204" pitchFamily="34" charset="0"/>
-            </a:endParaRPr>
-          </a:p>
-        </p:txBody>
-      </p:sp>
-      <p:sp>
-        <p:nvSpPr>
-          <p:cNvPr id="36" name="Текстово поле 17">
-            <a:extLst>
-              <a:ext uri="{FF2B5EF4-FFF2-40B4-BE49-F238E27FC236}">
-                <a16:creationId xmlns:a16="http://schemas.microsoft.com/office/drawing/2014/main" id="{7F5DDDB3-3F24-48C7-B9CA-C8D03CAB82D2}"/>
-              </a:ext>
-            </a:extLst>
-          </p:cNvPr>
-          <p:cNvSpPr txBox="1"/>
-          <p:nvPr/>
-        </p:nvSpPr>
-        <p:spPr>
-          <a:xfrm>
-            <a:off x="5381097" y="4692989"/>
-            <a:ext cx="867784" cy="307777"/>
-          </a:xfrm>
-          <a:prstGeom prst="rect">
-            <a:avLst/>
-          </a:prstGeom>
-          <a:noFill/>
-        </p:spPr>
-        <p:txBody>
-          <a:bodyPr wrap="square" rtlCol="0">
-            <a:spAutoFit/>
-          </a:bodyPr>
-          <a:lstStyle/>
-          <a:p>
-            <a:r>
-              <a:rPr lang="en-US" sz="1400" dirty="0">
-                <a:latin typeface="Arial" panose="020B0604020202020204" pitchFamily="34" charset="0"/>
-                <a:cs typeface="Arial" panose="020B0604020202020204" pitchFamily="34" charset="0"/>
-              </a:rPr>
-              <a:t>OPC UA</a:t>
-            </a:r>
-            <a:endParaRPr lang="bg-BG" sz="1400" dirty="0">
-              <a:latin typeface="Arial" panose="020B0604020202020204" pitchFamily="34" charset="0"/>
-              <a:cs typeface="Arial" panose="020B0604020202020204" pitchFamily="34" charset="0"/>
-            </a:endParaRPr>
-          </a:p>
-        </p:txBody>
-      </p:sp>
-    </p:spTree>
-    <p:extLst>
-      <p:ext uri="{BB962C8B-B14F-4D97-AF65-F5344CB8AC3E}">
-        <p14:creationId xmlns:p14="http://schemas.microsoft.com/office/powerpoint/2010/main" val="158121558"/>
       </p:ext>
     </p:extLst>
   </p:cSld>
@@ -17963,6 +17470,832 @@
 </file>
 
 <file path=ppt/slides/slide20.xml><?xml version="1.0" encoding="utf-8"?>
+<p:sld xmlns:a="http://schemas.openxmlformats.org/drawingml/2006/main" xmlns:r="http://schemas.openxmlformats.org/officeDocument/2006/relationships" xmlns:p="http://schemas.openxmlformats.org/presentationml/2006/main">
+  <p:cSld>
+    <p:spTree>
+      <p:nvGrpSpPr>
+        <p:cNvPr id="1" name=""/>
+        <p:cNvGrpSpPr/>
+        <p:nvPr/>
+      </p:nvGrpSpPr>
+      <p:grpSpPr>
+        <a:xfrm>
+          <a:off x="0" y="0"/>
+          <a:ext cx="0" cy="0"/>
+          <a:chOff x="0" y="0"/>
+          <a:chExt cx="0" cy="0"/>
+        </a:xfrm>
+      </p:grpSpPr>
+      <p:sp>
+        <p:nvSpPr>
+          <p:cNvPr id="2" name="Заглавие 1">
+            <a:extLst>
+              <a:ext uri="{FF2B5EF4-FFF2-40B4-BE49-F238E27FC236}">
+                <a16:creationId xmlns:a16="http://schemas.microsoft.com/office/drawing/2014/main" id="{DA312324-62E5-4F74-BADC-A6E6208D8789}"/>
+              </a:ext>
+            </a:extLst>
+          </p:cNvPr>
+          <p:cNvSpPr>
+            <a:spLocks noGrp="1"/>
+          </p:cNvSpPr>
+          <p:nvPr>
+            <p:ph type="title"/>
+          </p:nvPr>
+        </p:nvSpPr>
+        <p:spPr>
+          <a:xfrm>
+            <a:off x="1154955" y="1295400"/>
+            <a:ext cx="2793158" cy="967033"/>
+          </a:xfrm>
+        </p:spPr>
+        <p:txBody>
+          <a:bodyPr/>
+          <a:lstStyle/>
+          <a:p>
+            <a:pPr algn="ctr"/>
+            <a:r>
+              <a:rPr lang="en-US" dirty="0">
+                <a:latin typeface="Arial" panose="020B0604020202020204" pitchFamily="34" charset="0"/>
+                <a:cs typeface="Arial" panose="020B0604020202020204" pitchFamily="34" charset="0"/>
+              </a:rPr>
+              <a:t>Komax Connect Project</a:t>
+            </a:r>
+            <a:endParaRPr lang="bg-BG" dirty="0">
+              <a:latin typeface="Arial" panose="020B0604020202020204" pitchFamily="34" charset="0"/>
+              <a:cs typeface="Arial" panose="020B0604020202020204" pitchFamily="34" charset="0"/>
+            </a:endParaRPr>
+          </a:p>
+        </p:txBody>
+      </p:sp>
+      <p:pic>
+        <p:nvPicPr>
+          <p:cNvPr id="25" name="Контейнер за съдържание 24">
+            <a:extLst>
+              <a:ext uri="{FF2B5EF4-FFF2-40B4-BE49-F238E27FC236}">
+                <a16:creationId xmlns:a16="http://schemas.microsoft.com/office/drawing/2014/main" id="{D593F352-3381-497A-918A-13E4DA2369A8}"/>
+              </a:ext>
+            </a:extLst>
+          </p:cNvPr>
+          <p:cNvPicPr>
+            <a:picLocks noGrp="1" noChangeAspect="1"/>
+          </p:cNvPicPr>
+          <p:nvPr>
+            <p:ph idx="1"/>
+          </p:nvPr>
+        </p:nvPicPr>
+        <p:blipFill>
+          <a:blip r:embed="rId2">
+            <a:extLst>
+              <a:ext uri="{28A0092B-C50C-407E-A947-70E740481C1C}">
+                <a14:useLocalDpi xmlns:a14="http://schemas.microsoft.com/office/drawing/2010/main" val="0"/>
+              </a:ext>
+            </a:extLst>
+          </a:blip>
+          <a:stretch>
+            <a:fillRect/>
+          </a:stretch>
+        </p:blipFill>
+        <p:spPr>
+          <a:xfrm>
+            <a:off x="5518388" y="2337610"/>
+            <a:ext cx="6112887" cy="2701251"/>
+          </a:xfrm>
+        </p:spPr>
+      </p:pic>
+      <p:sp>
+        <p:nvSpPr>
+          <p:cNvPr id="4" name="Текстов контейнер 3">
+            <a:extLst>
+              <a:ext uri="{FF2B5EF4-FFF2-40B4-BE49-F238E27FC236}">
+                <a16:creationId xmlns:a16="http://schemas.microsoft.com/office/drawing/2014/main" id="{1590427F-5578-45C5-846B-BA827311EFE3}"/>
+              </a:ext>
+            </a:extLst>
+          </p:cNvPr>
+          <p:cNvSpPr>
+            <a:spLocks noGrp="1"/>
+          </p:cNvSpPr>
+          <p:nvPr>
+            <p:ph type="body" sz="half" idx="2"/>
+          </p:nvPr>
+        </p:nvSpPr>
+        <p:spPr>
+          <a:xfrm>
+            <a:off x="1154954" y="2582944"/>
+            <a:ext cx="3162522" cy="3441935"/>
+          </a:xfrm>
+        </p:spPr>
+        <p:txBody>
+          <a:bodyPr>
+            <a:noAutofit/>
+          </a:bodyPr>
+          <a:lstStyle/>
+          <a:p>
+            <a:r>
+              <a:rPr lang="en-US" sz="1600" dirty="0">
+                <a:solidFill>
+                  <a:schemeClr val="bg1"/>
+                </a:solidFill>
+                <a:latin typeface="Arial" panose="020B0604020202020204" pitchFamily="34" charset="0"/>
+                <a:cs typeface="Arial" panose="020B0604020202020204" pitchFamily="34" charset="0"/>
+              </a:rPr>
+              <a:t>We already have an initial  connection between CS WIN and the cloud KOMAX system.</a:t>
+            </a:r>
+          </a:p>
+          <a:p>
+            <a:r>
+              <a:rPr lang="en-US" sz="1600" dirty="0">
+                <a:solidFill>
+                  <a:schemeClr val="bg1"/>
+                </a:solidFill>
+                <a:latin typeface="Arial" panose="020B0604020202020204" pitchFamily="34" charset="0"/>
+                <a:cs typeface="Arial" panose="020B0604020202020204" pitchFamily="34" charset="0"/>
+              </a:rPr>
+              <a:t>For this purpose were developed CS WIN COM object which serves as a OPC UA client and OPC UA server which is a Windows service app that running on the same PC.</a:t>
+            </a:r>
+          </a:p>
+        </p:txBody>
+      </p:sp>
+    </p:spTree>
+    <p:extLst>
+      <p:ext uri="{BB962C8B-B14F-4D97-AF65-F5344CB8AC3E}">
+        <p14:creationId xmlns:p14="http://schemas.microsoft.com/office/powerpoint/2010/main" val="2705067992"/>
+      </p:ext>
+    </p:extLst>
+  </p:cSld>
+  <p:clrMapOvr>
+    <a:masterClrMapping/>
+  </p:clrMapOvr>
+</p:sld>
+</file>
+
+<file path=ppt/slides/slide21.xml><?xml version="1.0" encoding="utf-8"?>
+<p:sld xmlns:a="http://schemas.openxmlformats.org/drawingml/2006/main" xmlns:r="http://schemas.openxmlformats.org/officeDocument/2006/relationships" xmlns:p="http://schemas.openxmlformats.org/presentationml/2006/main">
+  <p:cSld>
+    <p:spTree>
+      <p:nvGrpSpPr>
+        <p:cNvPr id="1" name=""/>
+        <p:cNvGrpSpPr/>
+        <p:nvPr/>
+      </p:nvGrpSpPr>
+      <p:grpSpPr>
+        <a:xfrm>
+          <a:off x="0" y="0"/>
+          <a:ext cx="0" cy="0"/>
+          <a:chOff x="0" y="0"/>
+          <a:chExt cx="0" cy="0"/>
+        </a:xfrm>
+      </p:grpSpPr>
+      <p:sp>
+        <p:nvSpPr>
+          <p:cNvPr id="2" name="Title 1"/>
+          <p:cNvSpPr>
+            <a:spLocks noGrp="1"/>
+          </p:cNvSpPr>
+          <p:nvPr>
+            <p:ph type="title"/>
+          </p:nvPr>
+        </p:nvSpPr>
+        <p:spPr/>
+        <p:txBody>
+          <a:bodyPr/>
+          <a:lstStyle/>
+          <a:p>
+            <a:pPr algn="ctr"/>
+            <a:r>
+              <a:rPr lang="en-US" dirty="0">
+                <a:latin typeface="Arial" panose="020B0604020202020204" pitchFamily="34" charset="0"/>
+                <a:cs typeface="Arial" panose="020B0604020202020204" pitchFamily="34" charset="0"/>
+              </a:rPr>
+              <a:t>KOMAX Connect Project (demo)</a:t>
+            </a:r>
+          </a:p>
+        </p:txBody>
+      </p:sp>
+      <p:pic>
+        <p:nvPicPr>
+          <p:cNvPr id="4" name="Контейнер за съдържание 9">
+            <a:extLst>
+              <a:ext uri="{FF2B5EF4-FFF2-40B4-BE49-F238E27FC236}">
+                <a16:creationId xmlns:a16="http://schemas.microsoft.com/office/drawing/2014/main" id="{C0DD5992-5E6D-4267-87DF-67E399EB88BA}"/>
+              </a:ext>
+            </a:extLst>
+          </p:cNvPr>
+          <p:cNvPicPr>
+            <a:picLocks noGrp="1" noChangeAspect="1"/>
+          </p:cNvPicPr>
+          <p:nvPr>
+            <p:ph idx="1"/>
+          </p:nvPr>
+        </p:nvPicPr>
+        <p:blipFill>
+          <a:blip r:embed="rId2" cstate="hqprint">
+            <a:extLst>
+              <a:ext uri="{28A0092B-C50C-407E-A947-70E740481C1C}">
+                <a14:useLocalDpi xmlns:a14="http://schemas.microsoft.com/office/drawing/2010/main" val="0"/>
+              </a:ext>
+            </a:extLst>
+          </a:blip>
+          <a:stretch>
+            <a:fillRect/>
+          </a:stretch>
+        </p:blipFill>
+        <p:spPr>
+          <a:xfrm>
+            <a:off x="518728" y="4243705"/>
+            <a:ext cx="936576" cy="817426"/>
+          </a:xfrm>
+          <a:prstGeom prst="rect">
+            <a:avLst/>
+          </a:prstGeom>
+        </p:spPr>
+      </p:pic>
+      <p:pic>
+        <p:nvPicPr>
+          <p:cNvPr id="5" name="Picture 4"/>
+          <p:cNvPicPr>
+            <a:picLocks noChangeAspect="1"/>
+          </p:cNvPicPr>
+          <p:nvPr/>
+        </p:nvPicPr>
+        <p:blipFill>
+          <a:blip r:embed="rId3">
+            <a:extLst>
+              <a:ext uri="{28A0092B-C50C-407E-A947-70E740481C1C}">
+                <a14:useLocalDpi xmlns:a14="http://schemas.microsoft.com/office/drawing/2010/main" val="0"/>
+              </a:ext>
+            </a:extLst>
+          </a:blip>
+          <a:stretch>
+            <a:fillRect/>
+          </a:stretch>
+        </p:blipFill>
+        <p:spPr>
+          <a:xfrm>
+            <a:off x="9390613" y="4054358"/>
+            <a:ext cx="1564248" cy="1018449"/>
+          </a:xfrm>
+          <a:prstGeom prst="rect">
+            <a:avLst/>
+          </a:prstGeom>
+        </p:spPr>
+      </p:pic>
+      <p:pic>
+        <p:nvPicPr>
+          <p:cNvPr id="6" name="Picture 5"/>
+          <p:cNvPicPr>
+            <a:picLocks noChangeAspect="1"/>
+          </p:cNvPicPr>
+          <p:nvPr/>
+        </p:nvPicPr>
+        <p:blipFill>
+          <a:blip r:embed="rId4">
+            <a:extLst>
+              <a:ext uri="{28A0092B-C50C-407E-A947-70E740481C1C}">
+                <a14:useLocalDpi xmlns:a14="http://schemas.microsoft.com/office/drawing/2010/main" val="0"/>
+              </a:ext>
+            </a:extLst>
+          </a:blip>
+          <a:stretch>
+            <a:fillRect/>
+          </a:stretch>
+        </p:blipFill>
+        <p:spPr>
+          <a:xfrm>
+            <a:off x="4041822" y="4257786"/>
+            <a:ext cx="801737" cy="777122"/>
+          </a:xfrm>
+          <a:prstGeom prst="rect">
+            <a:avLst/>
+          </a:prstGeom>
+        </p:spPr>
+      </p:pic>
+      <p:sp>
+        <p:nvSpPr>
+          <p:cNvPr id="9" name="Текстово поле 17">
+            <a:extLst>
+              <a:ext uri="{FF2B5EF4-FFF2-40B4-BE49-F238E27FC236}">
+                <a16:creationId xmlns:a16="http://schemas.microsoft.com/office/drawing/2014/main" id="{7F5DDDB3-3F24-48C7-B9CA-C8D03CAB82D2}"/>
+              </a:ext>
+            </a:extLst>
+          </p:cNvPr>
+          <p:cNvSpPr txBox="1"/>
+          <p:nvPr/>
+        </p:nvSpPr>
+        <p:spPr>
+          <a:xfrm>
+            <a:off x="3897746" y="3734566"/>
+            <a:ext cx="1483351" cy="523220"/>
+          </a:xfrm>
+          <a:prstGeom prst="rect">
+            <a:avLst/>
+          </a:prstGeom>
+          <a:noFill/>
+        </p:spPr>
+        <p:txBody>
+          <a:bodyPr wrap="square" rtlCol="0">
+            <a:spAutoFit/>
+          </a:bodyPr>
+          <a:lstStyle/>
+          <a:p>
+            <a:r>
+              <a:rPr lang="en-US" sz="1400" dirty="0">
+                <a:latin typeface="Arial" panose="020B0604020202020204" pitchFamily="34" charset="0"/>
+                <a:cs typeface="Arial" panose="020B0604020202020204" pitchFamily="34" charset="0"/>
+              </a:rPr>
+              <a:t>OPC UA server (Win service)</a:t>
+            </a:r>
+            <a:endParaRPr lang="bg-BG" sz="1400" dirty="0">
+              <a:latin typeface="Arial" panose="020B0604020202020204" pitchFamily="34" charset="0"/>
+              <a:cs typeface="Arial" panose="020B0604020202020204" pitchFamily="34" charset="0"/>
+            </a:endParaRPr>
+          </a:p>
+        </p:txBody>
+      </p:sp>
+      <p:cxnSp>
+        <p:nvCxnSpPr>
+          <p:cNvPr id="10" name="Съединител &quot;права стрелка&quot; 10">
+            <a:extLst>
+              <a:ext uri="{FF2B5EF4-FFF2-40B4-BE49-F238E27FC236}">
+                <a16:creationId xmlns:a16="http://schemas.microsoft.com/office/drawing/2014/main" id="{7928FC36-829C-421E-9AB1-B7301E06C832}"/>
+              </a:ext>
+            </a:extLst>
+          </p:cNvPr>
+          <p:cNvCxnSpPr>
+            <a:cxnSpLocks/>
+          </p:cNvCxnSpPr>
+          <p:nvPr/>
+        </p:nvCxnSpPr>
+        <p:spPr>
+          <a:xfrm flipV="1">
+            <a:off x="1542569" y="4640006"/>
+            <a:ext cx="2347792" cy="12682"/>
+          </a:xfrm>
+          <a:prstGeom prst="straightConnector1">
+            <a:avLst/>
+          </a:prstGeom>
+          <a:ln>
+            <a:tailEnd type="triangle"/>
+          </a:ln>
+        </p:spPr>
+        <p:style>
+          <a:lnRef idx="1">
+            <a:schemeClr val="dk1"/>
+          </a:lnRef>
+          <a:fillRef idx="0">
+            <a:schemeClr val="dk1"/>
+          </a:fillRef>
+          <a:effectRef idx="0">
+            <a:schemeClr val="dk1"/>
+          </a:effectRef>
+          <a:fontRef idx="minor">
+            <a:schemeClr val="tx1"/>
+          </a:fontRef>
+        </p:style>
+      </p:cxnSp>
+      <p:sp>
+        <p:nvSpPr>
+          <p:cNvPr id="13" name="Текстово поле 17">
+            <a:extLst>
+              <a:ext uri="{FF2B5EF4-FFF2-40B4-BE49-F238E27FC236}">
+                <a16:creationId xmlns:a16="http://schemas.microsoft.com/office/drawing/2014/main" id="{7F5DDDB3-3F24-48C7-B9CA-C8D03CAB82D2}"/>
+              </a:ext>
+            </a:extLst>
+          </p:cNvPr>
+          <p:cNvSpPr txBox="1"/>
+          <p:nvPr/>
+        </p:nvSpPr>
+        <p:spPr>
+          <a:xfrm>
+            <a:off x="332925" y="3448319"/>
+            <a:ext cx="1410390" cy="738664"/>
+          </a:xfrm>
+          <a:prstGeom prst="rect">
+            <a:avLst/>
+          </a:prstGeom>
+          <a:noFill/>
+        </p:spPr>
+        <p:txBody>
+          <a:bodyPr wrap="square" rtlCol="0">
+            <a:spAutoFit/>
+          </a:bodyPr>
+          <a:lstStyle/>
+          <a:p>
+            <a:r>
+              <a:rPr lang="en-US" sz="1400" dirty="0">
+                <a:latin typeface="Arial" panose="020B0604020202020204" pitchFamily="34" charset="0"/>
+                <a:cs typeface="Arial" panose="020B0604020202020204" pitchFamily="34" charset="0"/>
+              </a:rPr>
+              <a:t>CS WIN </a:t>
+            </a:r>
+          </a:p>
+          <a:p>
+            <a:r>
+              <a:rPr lang="en-US" sz="1400" dirty="0">
+                <a:latin typeface="Arial" panose="020B0604020202020204" pitchFamily="34" charset="0"/>
+                <a:cs typeface="Arial" panose="020B0604020202020204" pitchFamily="34" charset="0"/>
+              </a:rPr>
+              <a:t>(OPC UA client</a:t>
+            </a:r>
+          </a:p>
+          <a:p>
+            <a:r>
+              <a:rPr lang="en-US" sz="1400" dirty="0">
+                <a:latin typeface="Arial" panose="020B0604020202020204" pitchFamily="34" charset="0"/>
+                <a:cs typeface="Arial" panose="020B0604020202020204" pitchFamily="34" charset="0"/>
+              </a:rPr>
+              <a:t> – COM object)</a:t>
+            </a:r>
+            <a:endParaRPr lang="bg-BG" sz="1400" dirty="0">
+              <a:latin typeface="Arial" panose="020B0604020202020204" pitchFamily="34" charset="0"/>
+              <a:cs typeface="Arial" panose="020B0604020202020204" pitchFamily="34" charset="0"/>
+            </a:endParaRPr>
+          </a:p>
+        </p:txBody>
+      </p:sp>
+      <p:pic>
+        <p:nvPicPr>
+          <p:cNvPr id="21" name="Контейнер за съдържание 7">
+            <a:extLst>
+              <a:ext uri="{FF2B5EF4-FFF2-40B4-BE49-F238E27FC236}">
+                <a16:creationId xmlns:a16="http://schemas.microsoft.com/office/drawing/2014/main" id="{E0C74E10-020B-46E3-AFAC-3A0647E97630}"/>
+              </a:ext>
+            </a:extLst>
+          </p:cNvPr>
+          <p:cNvPicPr>
+            <a:picLocks noChangeAspect="1"/>
+          </p:cNvPicPr>
+          <p:nvPr/>
+        </p:nvPicPr>
+        <p:blipFill>
+          <a:blip r:embed="rId5">
+            <a:extLst>
+              <a:ext uri="{28A0092B-C50C-407E-A947-70E740481C1C}">
+                <a14:useLocalDpi xmlns:a14="http://schemas.microsoft.com/office/drawing/2010/main" val="0"/>
+              </a:ext>
+            </a:extLst>
+          </a:blip>
+          <a:stretch>
+            <a:fillRect/>
+          </a:stretch>
+        </p:blipFill>
+        <p:spPr>
+          <a:xfrm>
+            <a:off x="6569439" y="3888839"/>
+            <a:ext cx="1264951" cy="1264951"/>
+          </a:xfrm>
+          <a:prstGeom prst="rect">
+            <a:avLst/>
+          </a:prstGeom>
+        </p:spPr>
+      </p:pic>
+      <p:sp>
+        <p:nvSpPr>
+          <p:cNvPr id="22" name="Текстово поле 17">
+            <a:extLst>
+              <a:ext uri="{FF2B5EF4-FFF2-40B4-BE49-F238E27FC236}">
+                <a16:creationId xmlns:a16="http://schemas.microsoft.com/office/drawing/2014/main" id="{7F5DDDB3-3F24-48C7-B9CA-C8D03CAB82D2}"/>
+              </a:ext>
+            </a:extLst>
+          </p:cNvPr>
+          <p:cNvSpPr txBox="1"/>
+          <p:nvPr/>
+        </p:nvSpPr>
+        <p:spPr>
+          <a:xfrm>
+            <a:off x="6443893" y="3580677"/>
+            <a:ext cx="1599417" cy="307777"/>
+          </a:xfrm>
+          <a:prstGeom prst="rect">
+            <a:avLst/>
+          </a:prstGeom>
+          <a:noFill/>
+        </p:spPr>
+        <p:txBody>
+          <a:bodyPr wrap="square" rtlCol="0">
+            <a:spAutoFit/>
+          </a:bodyPr>
+          <a:lstStyle/>
+          <a:p>
+            <a:r>
+              <a:rPr lang="en-US" sz="1400" dirty="0">
+                <a:latin typeface="Arial" panose="020B0604020202020204" pitchFamily="34" charset="0"/>
+                <a:cs typeface="Arial" panose="020B0604020202020204" pitchFamily="34" charset="0"/>
+              </a:rPr>
+              <a:t>KOMAX Gateway</a:t>
+            </a:r>
+            <a:endParaRPr lang="bg-BG" sz="1400" dirty="0">
+              <a:latin typeface="Arial" panose="020B0604020202020204" pitchFamily="34" charset="0"/>
+              <a:cs typeface="Arial" panose="020B0604020202020204" pitchFamily="34" charset="0"/>
+            </a:endParaRPr>
+          </a:p>
+        </p:txBody>
+      </p:sp>
+      <p:sp>
+        <p:nvSpPr>
+          <p:cNvPr id="23" name="Текстово поле 17">
+            <a:extLst>
+              <a:ext uri="{FF2B5EF4-FFF2-40B4-BE49-F238E27FC236}">
+                <a16:creationId xmlns:a16="http://schemas.microsoft.com/office/drawing/2014/main" id="{7F5DDDB3-3F24-48C7-B9CA-C8D03CAB82D2}"/>
+              </a:ext>
+            </a:extLst>
+          </p:cNvPr>
+          <p:cNvSpPr txBox="1"/>
+          <p:nvPr/>
+        </p:nvSpPr>
+        <p:spPr>
+          <a:xfrm>
+            <a:off x="9317959" y="3663763"/>
+            <a:ext cx="1599417" cy="307777"/>
+          </a:xfrm>
+          <a:prstGeom prst="rect">
+            <a:avLst/>
+          </a:prstGeom>
+          <a:noFill/>
+        </p:spPr>
+        <p:txBody>
+          <a:bodyPr wrap="square" rtlCol="0">
+            <a:spAutoFit/>
+          </a:bodyPr>
+          <a:lstStyle/>
+          <a:p>
+            <a:r>
+              <a:rPr lang="en-US" sz="1400" dirty="0">
+                <a:latin typeface="Arial" panose="020B0604020202020204" pitchFamily="34" charset="0"/>
+                <a:cs typeface="Arial" panose="020B0604020202020204" pitchFamily="34" charset="0"/>
+              </a:rPr>
+              <a:t>Cloud dashboard</a:t>
+            </a:r>
+            <a:endParaRPr lang="bg-BG" sz="1400" dirty="0">
+              <a:latin typeface="Arial" panose="020B0604020202020204" pitchFamily="34" charset="0"/>
+              <a:cs typeface="Arial" panose="020B0604020202020204" pitchFamily="34" charset="0"/>
+            </a:endParaRPr>
+          </a:p>
+        </p:txBody>
+      </p:sp>
+      <p:cxnSp>
+        <p:nvCxnSpPr>
+          <p:cNvPr id="24" name="Съединител &quot;права стрелка&quot; 10">
+            <a:extLst>
+              <a:ext uri="{FF2B5EF4-FFF2-40B4-BE49-F238E27FC236}">
+                <a16:creationId xmlns:a16="http://schemas.microsoft.com/office/drawing/2014/main" id="{7928FC36-829C-421E-9AB1-B7301E06C832}"/>
+              </a:ext>
+            </a:extLst>
+          </p:cNvPr>
+          <p:cNvCxnSpPr>
+            <a:cxnSpLocks/>
+          </p:cNvCxnSpPr>
+          <p:nvPr/>
+        </p:nvCxnSpPr>
+        <p:spPr>
+          <a:xfrm flipV="1">
+            <a:off x="7739955" y="4557240"/>
+            <a:ext cx="1535415" cy="12684"/>
+          </a:xfrm>
+          <a:prstGeom prst="straightConnector1">
+            <a:avLst/>
+          </a:prstGeom>
+          <a:ln>
+            <a:tailEnd type="triangle"/>
+          </a:ln>
+        </p:spPr>
+        <p:style>
+          <a:lnRef idx="1">
+            <a:schemeClr val="dk1"/>
+          </a:lnRef>
+          <a:fillRef idx="0">
+            <a:schemeClr val="dk1"/>
+          </a:fillRef>
+          <a:effectRef idx="0">
+            <a:schemeClr val="dk1"/>
+          </a:effectRef>
+          <a:fontRef idx="minor">
+            <a:schemeClr val="tx1"/>
+          </a:fontRef>
+        </p:style>
+      </p:cxnSp>
+      <p:sp>
+        <p:nvSpPr>
+          <p:cNvPr id="25" name="Текстово поле 17">
+            <a:extLst>
+              <a:ext uri="{FF2B5EF4-FFF2-40B4-BE49-F238E27FC236}">
+                <a16:creationId xmlns:a16="http://schemas.microsoft.com/office/drawing/2014/main" id="{7F5DDDB3-3F24-48C7-B9CA-C8D03CAB82D2}"/>
+              </a:ext>
+            </a:extLst>
+          </p:cNvPr>
+          <p:cNvSpPr txBox="1"/>
+          <p:nvPr/>
+        </p:nvSpPr>
+        <p:spPr>
+          <a:xfrm>
+            <a:off x="1934865" y="4233635"/>
+            <a:ext cx="1599417" cy="307777"/>
+          </a:xfrm>
+          <a:prstGeom prst="rect">
+            <a:avLst/>
+          </a:prstGeom>
+          <a:noFill/>
+        </p:spPr>
+        <p:txBody>
+          <a:bodyPr wrap="square" rtlCol="0">
+            <a:spAutoFit/>
+          </a:bodyPr>
+          <a:lstStyle/>
+          <a:p>
+            <a:r>
+              <a:rPr lang="en-US" sz="1400" dirty="0">
+                <a:latin typeface="Arial" panose="020B0604020202020204" pitchFamily="34" charset="0"/>
+                <a:cs typeface="Arial" panose="020B0604020202020204" pitchFamily="34" charset="0"/>
+              </a:rPr>
+              <a:t>write data</a:t>
+            </a:r>
+            <a:endParaRPr lang="bg-BG" sz="1400" dirty="0">
+              <a:latin typeface="Arial" panose="020B0604020202020204" pitchFamily="34" charset="0"/>
+              <a:cs typeface="Arial" panose="020B0604020202020204" pitchFamily="34" charset="0"/>
+            </a:endParaRPr>
+          </a:p>
+        </p:txBody>
+      </p:sp>
+      <p:cxnSp>
+        <p:nvCxnSpPr>
+          <p:cNvPr id="28" name="Съединител &quot;права стрелка&quot; 10">
+            <a:extLst>
+              <a:ext uri="{FF2B5EF4-FFF2-40B4-BE49-F238E27FC236}">
+                <a16:creationId xmlns:a16="http://schemas.microsoft.com/office/drawing/2014/main" id="{7928FC36-829C-421E-9AB1-B7301E06C832}"/>
+              </a:ext>
+            </a:extLst>
+          </p:cNvPr>
+          <p:cNvCxnSpPr>
+            <a:cxnSpLocks/>
+          </p:cNvCxnSpPr>
+          <p:nvPr/>
+        </p:nvCxnSpPr>
+        <p:spPr>
+          <a:xfrm flipH="1">
+            <a:off x="5018090" y="4605437"/>
+            <a:ext cx="1535416" cy="3430"/>
+          </a:xfrm>
+          <a:prstGeom prst="straightConnector1">
+            <a:avLst/>
+          </a:prstGeom>
+          <a:ln>
+            <a:tailEnd type="triangle"/>
+          </a:ln>
+        </p:spPr>
+        <p:style>
+          <a:lnRef idx="1">
+            <a:schemeClr val="dk1"/>
+          </a:lnRef>
+          <a:fillRef idx="0">
+            <a:schemeClr val="dk1"/>
+          </a:fillRef>
+          <a:effectRef idx="0">
+            <a:schemeClr val="dk1"/>
+          </a:effectRef>
+          <a:fontRef idx="minor">
+            <a:schemeClr val="tx1"/>
+          </a:fontRef>
+        </p:style>
+      </p:cxnSp>
+      <p:sp>
+        <p:nvSpPr>
+          <p:cNvPr id="34" name="Текстово поле 17">
+            <a:extLst>
+              <a:ext uri="{FF2B5EF4-FFF2-40B4-BE49-F238E27FC236}">
+                <a16:creationId xmlns:a16="http://schemas.microsoft.com/office/drawing/2014/main" id="{7F5DDDB3-3F24-48C7-B9CA-C8D03CAB82D2}"/>
+              </a:ext>
+            </a:extLst>
+          </p:cNvPr>
+          <p:cNvSpPr txBox="1"/>
+          <p:nvPr/>
+        </p:nvSpPr>
+        <p:spPr>
+          <a:xfrm>
+            <a:off x="5354951" y="4213538"/>
+            <a:ext cx="1003143" cy="307777"/>
+          </a:xfrm>
+          <a:prstGeom prst="rect">
+            <a:avLst/>
+          </a:prstGeom>
+          <a:noFill/>
+        </p:spPr>
+        <p:txBody>
+          <a:bodyPr wrap="square" rtlCol="0">
+            <a:spAutoFit/>
+          </a:bodyPr>
+          <a:lstStyle/>
+          <a:p>
+            <a:r>
+              <a:rPr lang="en-US" sz="1400" dirty="0">
+                <a:latin typeface="Arial" panose="020B0604020202020204" pitchFamily="34" charset="0"/>
+                <a:cs typeface="Arial" panose="020B0604020202020204" pitchFamily="34" charset="0"/>
+              </a:rPr>
+              <a:t>read data</a:t>
+            </a:r>
+            <a:endParaRPr lang="bg-BG" sz="1400" dirty="0">
+              <a:latin typeface="Arial" panose="020B0604020202020204" pitchFamily="34" charset="0"/>
+              <a:cs typeface="Arial" panose="020B0604020202020204" pitchFamily="34" charset="0"/>
+            </a:endParaRPr>
+          </a:p>
+        </p:txBody>
+      </p:sp>
+      <p:sp>
+        <p:nvSpPr>
+          <p:cNvPr id="35" name="Текстово поле 17">
+            <a:extLst>
+              <a:ext uri="{FF2B5EF4-FFF2-40B4-BE49-F238E27FC236}">
+                <a16:creationId xmlns:a16="http://schemas.microsoft.com/office/drawing/2014/main" id="{7F5DDDB3-3F24-48C7-B9CA-C8D03CAB82D2}"/>
+              </a:ext>
+            </a:extLst>
+          </p:cNvPr>
+          <p:cNvSpPr txBox="1"/>
+          <p:nvPr/>
+        </p:nvSpPr>
+        <p:spPr>
+          <a:xfrm>
+            <a:off x="2115766" y="4706978"/>
+            <a:ext cx="867784" cy="307777"/>
+          </a:xfrm>
+          <a:prstGeom prst="rect">
+            <a:avLst/>
+          </a:prstGeom>
+          <a:noFill/>
+        </p:spPr>
+        <p:txBody>
+          <a:bodyPr wrap="square" rtlCol="0">
+            <a:spAutoFit/>
+          </a:bodyPr>
+          <a:lstStyle/>
+          <a:p>
+            <a:r>
+              <a:rPr lang="en-US" sz="1400" dirty="0">
+                <a:latin typeface="Arial" panose="020B0604020202020204" pitchFamily="34" charset="0"/>
+                <a:cs typeface="Arial" panose="020B0604020202020204" pitchFamily="34" charset="0"/>
+              </a:rPr>
+              <a:t>OPC UA</a:t>
+            </a:r>
+            <a:endParaRPr lang="bg-BG" sz="1400" dirty="0">
+              <a:latin typeface="Arial" panose="020B0604020202020204" pitchFamily="34" charset="0"/>
+              <a:cs typeface="Arial" panose="020B0604020202020204" pitchFamily="34" charset="0"/>
+            </a:endParaRPr>
+          </a:p>
+        </p:txBody>
+      </p:sp>
+      <p:sp>
+        <p:nvSpPr>
+          <p:cNvPr id="36" name="Текстово поле 17">
+            <a:extLst>
+              <a:ext uri="{FF2B5EF4-FFF2-40B4-BE49-F238E27FC236}">
+                <a16:creationId xmlns:a16="http://schemas.microsoft.com/office/drawing/2014/main" id="{7F5DDDB3-3F24-48C7-B9CA-C8D03CAB82D2}"/>
+              </a:ext>
+            </a:extLst>
+          </p:cNvPr>
+          <p:cNvSpPr txBox="1"/>
+          <p:nvPr/>
+        </p:nvSpPr>
+        <p:spPr>
+          <a:xfrm>
+            <a:off x="5381097" y="4692989"/>
+            <a:ext cx="867784" cy="307777"/>
+          </a:xfrm>
+          <a:prstGeom prst="rect">
+            <a:avLst/>
+          </a:prstGeom>
+          <a:noFill/>
+        </p:spPr>
+        <p:txBody>
+          <a:bodyPr wrap="square" rtlCol="0">
+            <a:spAutoFit/>
+          </a:bodyPr>
+          <a:lstStyle/>
+          <a:p>
+            <a:r>
+              <a:rPr lang="en-US" sz="1400" dirty="0">
+                <a:latin typeface="Arial" panose="020B0604020202020204" pitchFamily="34" charset="0"/>
+                <a:cs typeface="Arial" panose="020B0604020202020204" pitchFamily="34" charset="0"/>
+              </a:rPr>
+              <a:t>OPC UA</a:t>
+            </a:r>
+            <a:endParaRPr lang="bg-BG" sz="1400" dirty="0">
+              <a:latin typeface="Arial" panose="020B0604020202020204" pitchFamily="34" charset="0"/>
+              <a:cs typeface="Arial" panose="020B0604020202020204" pitchFamily="34" charset="0"/>
+            </a:endParaRPr>
+          </a:p>
+        </p:txBody>
+      </p:sp>
+    </p:spTree>
+    <p:extLst>
+      <p:ext uri="{BB962C8B-B14F-4D97-AF65-F5344CB8AC3E}">
+        <p14:creationId xmlns:p14="http://schemas.microsoft.com/office/powerpoint/2010/main" val="158121558"/>
+      </p:ext>
+    </p:extLst>
+  </p:cSld>
+  <p:clrMapOvr>
+    <a:masterClrMapping/>
+  </p:clrMapOvr>
+</p:sld>
+</file>
+
+<file path=ppt/slides/slide22.xml><?xml version="1.0" encoding="utf-8"?>
 <p:sld xmlns:a="http://schemas.openxmlformats.org/drawingml/2006/main" xmlns:r="http://schemas.openxmlformats.org/officeDocument/2006/relationships" xmlns:p="http://schemas.openxmlformats.org/presentationml/2006/main">
   <p:cSld>
     <p:spTree>
@@ -18298,6 +18631,342 @@
       </p:grpSpPr>
       <p:sp>
         <p:nvSpPr>
+          <p:cNvPr id="2" name="Title 1"/>
+          <p:cNvSpPr>
+            <a:spLocks noGrp="1"/>
+          </p:cNvSpPr>
+          <p:nvPr>
+            <p:ph type="title"/>
+          </p:nvPr>
+        </p:nvSpPr>
+        <p:spPr>
+          <a:xfrm>
+            <a:off x="1154954" y="1646516"/>
+            <a:ext cx="2793158" cy="528647"/>
+          </a:xfrm>
+        </p:spPr>
+        <p:txBody>
+          <a:bodyPr/>
+          <a:lstStyle/>
+          <a:p>
+            <a:pPr algn="ctr"/>
+            <a:r>
+              <a:rPr lang="en-US" dirty="0" smtClean="0">
+                <a:latin typeface="Arial" panose="020B0604020202020204" pitchFamily="34" charset="0"/>
+                <a:cs typeface="Arial" panose="020B0604020202020204" pitchFamily="34" charset="0"/>
+              </a:rPr>
+              <a:t>Before OPC </a:t>
+            </a:r>
+            <a:endParaRPr lang="en-US" dirty="0">
+              <a:latin typeface="Arial" panose="020B0604020202020204" pitchFamily="34" charset="0"/>
+              <a:cs typeface="Arial" panose="020B0604020202020204" pitchFamily="34" charset="0"/>
+            </a:endParaRPr>
+          </a:p>
+        </p:txBody>
+      </p:sp>
+      <p:pic>
+        <p:nvPicPr>
+          <p:cNvPr id="6" name="Content Placeholder 5"/>
+          <p:cNvPicPr>
+            <a:picLocks noGrp="1" noChangeAspect="1"/>
+          </p:cNvPicPr>
+          <p:nvPr>
+            <p:ph idx="1"/>
+          </p:nvPr>
+        </p:nvPicPr>
+        <p:blipFill>
+          <a:blip r:embed="rId2">
+            <a:extLst>
+              <a:ext uri="{28A0092B-C50C-407E-A947-70E740481C1C}">
+                <a14:useLocalDpi xmlns:a14="http://schemas.microsoft.com/office/drawing/2010/main" val="0"/>
+              </a:ext>
+            </a:extLst>
+          </a:blip>
+          <a:stretch>
+            <a:fillRect/>
+          </a:stretch>
+        </p:blipFill>
+        <p:spPr>
+          <a:xfrm>
+            <a:off x="5289522" y="1907309"/>
+            <a:ext cx="6513865" cy="3431310"/>
+          </a:xfrm>
+        </p:spPr>
+      </p:pic>
+      <p:sp>
+        <p:nvSpPr>
+          <p:cNvPr id="7" name="Text Placeholder 6"/>
+          <p:cNvSpPr>
+            <a:spLocks noGrp="1"/>
+          </p:cNvSpPr>
+          <p:nvPr>
+            <p:ph type="body" sz="half" idx="2"/>
+          </p:nvPr>
+        </p:nvSpPr>
+        <p:spPr>
+          <a:xfrm>
+            <a:off x="1154954" y="2521528"/>
+            <a:ext cx="2793158" cy="3503352"/>
+          </a:xfrm>
+        </p:spPr>
+        <p:txBody>
+          <a:bodyPr/>
+          <a:lstStyle/>
+          <a:p>
+            <a:pPr marL="285750" indent="-285750">
+              <a:buClr>
+                <a:schemeClr val="bg1"/>
+              </a:buClr>
+              <a:buFont typeface="Arial" panose="020B0604020202020204" pitchFamily="34" charset="0"/>
+              <a:buChar char="•"/>
+            </a:pPr>
+            <a:r>
+              <a:rPr lang="en-US" sz="1600" dirty="0" smtClean="0">
+                <a:solidFill>
+                  <a:schemeClr val="bg1"/>
+                </a:solidFill>
+                <a:latin typeface="Arial" panose="020B0604020202020204" pitchFamily="34" charset="0"/>
+                <a:cs typeface="Arial" panose="020B0604020202020204" pitchFamily="34" charset="0"/>
+              </a:rPr>
+              <a:t>We have a driver diversity problems. </a:t>
+            </a:r>
+          </a:p>
+          <a:p>
+            <a:pPr marL="285750" indent="-285750">
+              <a:buClr>
+                <a:schemeClr val="bg1"/>
+              </a:buClr>
+              <a:buFont typeface="Arial" panose="020B0604020202020204" pitchFamily="34" charset="0"/>
+              <a:buChar char="•"/>
+            </a:pPr>
+            <a:r>
+              <a:rPr lang="en-US" sz="1600" dirty="0" smtClean="0">
+                <a:solidFill>
+                  <a:schemeClr val="bg1"/>
+                </a:solidFill>
+                <a:latin typeface="Arial" panose="020B0604020202020204" pitchFamily="34" charset="0"/>
+                <a:cs typeface="Arial" panose="020B0604020202020204" pitchFamily="34" charset="0"/>
+              </a:rPr>
+              <a:t>Our Windows OS system must have installed a bunch of drivers for the communication with all diversity of PLC devices.</a:t>
+            </a:r>
+          </a:p>
+          <a:p>
+            <a:pPr marL="285750" indent="-285750">
+              <a:buClr>
+                <a:schemeClr val="bg1"/>
+              </a:buClr>
+              <a:buFont typeface="Arial" panose="020B0604020202020204" pitchFamily="34" charset="0"/>
+              <a:buChar char="•"/>
+            </a:pPr>
+            <a:r>
+              <a:rPr lang="en-US" sz="1600" dirty="0" smtClean="0">
+                <a:solidFill>
+                  <a:schemeClr val="bg1"/>
+                </a:solidFill>
+                <a:latin typeface="Arial" panose="020B0604020202020204" pitchFamily="34" charset="0"/>
+                <a:cs typeface="Arial" panose="020B0604020202020204" pitchFamily="34" charset="0"/>
+              </a:rPr>
+              <a:t>Data is not easily passed to high level applications</a:t>
+            </a:r>
+          </a:p>
+          <a:p>
+            <a:endParaRPr lang="en-US" dirty="0" smtClean="0"/>
+          </a:p>
+        </p:txBody>
+      </p:sp>
+    </p:spTree>
+    <p:extLst>
+      <p:ext uri="{BB962C8B-B14F-4D97-AF65-F5344CB8AC3E}">
+        <p14:creationId xmlns:p14="http://schemas.microsoft.com/office/powerpoint/2010/main" val="2986647502"/>
+      </p:ext>
+    </p:extLst>
+  </p:cSld>
+  <p:clrMapOvr>
+    <a:masterClrMapping/>
+  </p:clrMapOvr>
+</p:sld>
+</file>
+
+<file path=ppt/slides/slide5.xml><?xml version="1.0" encoding="utf-8"?>
+<p:sld xmlns:a="http://schemas.openxmlformats.org/drawingml/2006/main" xmlns:r="http://schemas.openxmlformats.org/officeDocument/2006/relationships" xmlns:p="http://schemas.openxmlformats.org/presentationml/2006/main">
+  <p:cSld>
+    <p:spTree>
+      <p:nvGrpSpPr>
+        <p:cNvPr id="1" name=""/>
+        <p:cNvGrpSpPr/>
+        <p:nvPr/>
+      </p:nvGrpSpPr>
+      <p:grpSpPr>
+        <a:xfrm>
+          <a:off x="0" y="0"/>
+          <a:ext cx="0" cy="0"/>
+          <a:chOff x="0" y="0"/>
+          <a:chExt cx="0" cy="0"/>
+        </a:xfrm>
+      </p:grpSpPr>
+      <p:sp>
+        <p:nvSpPr>
+          <p:cNvPr id="2" name="Title 1"/>
+          <p:cNvSpPr>
+            <a:spLocks noGrp="1"/>
+          </p:cNvSpPr>
+          <p:nvPr>
+            <p:ph type="title"/>
+          </p:nvPr>
+        </p:nvSpPr>
+        <p:spPr>
+          <a:xfrm>
+            <a:off x="1302736" y="1463713"/>
+            <a:ext cx="2793158" cy="457200"/>
+          </a:xfrm>
+        </p:spPr>
+        <p:txBody>
+          <a:bodyPr/>
+          <a:lstStyle/>
+          <a:p>
+            <a:r>
+              <a:rPr lang="en-US" dirty="0" smtClean="0">
+                <a:latin typeface="Arial" panose="020B0604020202020204" pitchFamily="34" charset="0"/>
+                <a:cs typeface="Arial" panose="020B0604020202020204" pitchFamily="34" charset="0"/>
+              </a:rPr>
+              <a:t>Classic OPC</a:t>
+            </a:r>
+            <a:endParaRPr lang="en-US" dirty="0">
+              <a:latin typeface="Arial" panose="020B0604020202020204" pitchFamily="34" charset="0"/>
+              <a:cs typeface="Arial" panose="020B0604020202020204" pitchFamily="34" charset="0"/>
+            </a:endParaRPr>
+          </a:p>
+        </p:txBody>
+      </p:sp>
+      <p:pic>
+        <p:nvPicPr>
+          <p:cNvPr id="5" name="Content Placeholder 4"/>
+          <p:cNvPicPr>
+            <a:picLocks noGrp="1" noChangeAspect="1"/>
+          </p:cNvPicPr>
+          <p:nvPr>
+            <p:ph idx="1"/>
+          </p:nvPr>
+        </p:nvPicPr>
+        <p:blipFill>
+          <a:blip r:embed="rId2">
+            <a:extLst>
+              <a:ext uri="{28A0092B-C50C-407E-A947-70E740481C1C}">
+                <a14:useLocalDpi xmlns:a14="http://schemas.microsoft.com/office/drawing/2010/main" val="0"/>
+              </a:ext>
+            </a:extLst>
+          </a:blip>
+          <a:stretch>
+            <a:fillRect/>
+          </a:stretch>
+        </p:blipFill>
+        <p:spPr>
+          <a:xfrm>
+            <a:off x="5096587" y="1920913"/>
+            <a:ext cx="6812147" cy="3547014"/>
+          </a:xfrm>
+        </p:spPr>
+      </p:pic>
+      <p:sp>
+        <p:nvSpPr>
+          <p:cNvPr id="4" name="Text Placeholder 3"/>
+          <p:cNvSpPr>
+            <a:spLocks noGrp="1"/>
+          </p:cNvSpPr>
+          <p:nvPr>
+            <p:ph type="body" sz="half" idx="2"/>
+          </p:nvPr>
+        </p:nvSpPr>
+        <p:spPr>
+          <a:xfrm>
+            <a:off x="1002121" y="2179784"/>
+            <a:ext cx="2945991" cy="2927926"/>
+          </a:xfrm>
+        </p:spPr>
+        <p:txBody>
+          <a:bodyPr>
+            <a:normAutofit/>
+          </a:bodyPr>
+          <a:lstStyle/>
+          <a:p>
+            <a:pPr marL="285750" indent="-285750">
+              <a:buClr>
+                <a:schemeClr val="bg1"/>
+              </a:buClr>
+              <a:buFont typeface="Arial" panose="020B0604020202020204" pitchFamily="34" charset="0"/>
+              <a:buChar char="•"/>
+            </a:pPr>
+            <a:r>
+              <a:rPr lang="en-US" sz="1600" dirty="0" smtClean="0">
+                <a:solidFill>
+                  <a:schemeClr val="bg1"/>
+                </a:solidFill>
+                <a:latin typeface="Arial" panose="020B0604020202020204" pitchFamily="34" charset="0"/>
+                <a:cs typeface="Arial" panose="020B0604020202020204" pitchFamily="34" charset="0"/>
+              </a:rPr>
+              <a:t>Idea is to have a central standard interface (OPC Server) which can be accessed via OPC Clients.</a:t>
+            </a:r>
+          </a:p>
+          <a:p>
+            <a:pPr marL="285750" indent="-285750">
+              <a:buClr>
+                <a:schemeClr val="bg1"/>
+              </a:buClr>
+              <a:buFont typeface="Arial" panose="020B0604020202020204" pitchFamily="34" charset="0"/>
+              <a:buChar char="•"/>
+            </a:pPr>
+            <a:r>
+              <a:rPr lang="en-US" sz="1600" dirty="0" smtClean="0">
+                <a:solidFill>
+                  <a:schemeClr val="bg1"/>
+                </a:solidFill>
+                <a:latin typeface="Arial" panose="020B0604020202020204" pitchFamily="34" charset="0"/>
+                <a:cs typeface="Arial" panose="020B0604020202020204" pitchFamily="34" charset="0"/>
+              </a:rPr>
+              <a:t>On this way all PLC devices can upload there data on this OPC server and the same data can be accessed directly by OPC Clients.</a:t>
+            </a:r>
+            <a:endParaRPr lang="en-US" sz="1600" dirty="0">
+              <a:solidFill>
+                <a:schemeClr val="bg1"/>
+              </a:solidFill>
+              <a:latin typeface="Arial" panose="020B0604020202020204" pitchFamily="34" charset="0"/>
+              <a:cs typeface="Arial" panose="020B0604020202020204" pitchFamily="34" charset="0"/>
+            </a:endParaRPr>
+          </a:p>
+        </p:txBody>
+      </p:sp>
+    </p:spTree>
+    <p:extLst>
+      <p:ext uri="{BB962C8B-B14F-4D97-AF65-F5344CB8AC3E}">
+        <p14:creationId xmlns:p14="http://schemas.microsoft.com/office/powerpoint/2010/main" val="2537613998"/>
+      </p:ext>
+    </p:extLst>
+  </p:cSld>
+  <p:clrMapOvr>
+    <a:masterClrMapping/>
+  </p:clrMapOvr>
+</p:sld>
+</file>
+
+<file path=ppt/slides/slide6.xml><?xml version="1.0" encoding="utf-8"?>
+<p:sld xmlns:a="http://schemas.openxmlformats.org/drawingml/2006/main" xmlns:r="http://schemas.openxmlformats.org/officeDocument/2006/relationships" xmlns:p="http://schemas.openxmlformats.org/presentationml/2006/main">
+  <p:cSld>
+    <p:spTree>
+      <p:nvGrpSpPr>
+        <p:cNvPr id="1" name=""/>
+        <p:cNvGrpSpPr/>
+        <p:nvPr/>
+      </p:nvGrpSpPr>
+      <p:grpSpPr>
+        <a:xfrm>
+          <a:off x="0" y="0"/>
+          <a:ext cx="0" cy="0"/>
+          <a:chOff x="0" y="0"/>
+          <a:chExt cx="0" cy="0"/>
+        </a:xfrm>
+      </p:grpSpPr>
+      <p:sp>
+        <p:nvSpPr>
           <p:cNvPr id="2" name="Заглавие 1">
             <a:extLst>
               <a:ext uri="{FF2B5EF4-FFF2-40B4-BE49-F238E27FC236}">
@@ -18549,7 +19218,7 @@
 </p:sld>
 </file>
 
-<file path=ppt/slides/slide5.xml><?xml version="1.0" encoding="utf-8"?>
+<file path=ppt/slides/slide7.xml><?xml version="1.0" encoding="utf-8"?>
 <p:sld xmlns:a="http://schemas.openxmlformats.org/drawingml/2006/main" xmlns:r="http://schemas.openxmlformats.org/officeDocument/2006/relationships" xmlns:p="http://schemas.openxmlformats.org/presentationml/2006/main">
   <p:cSld>
     <p:spTree>
@@ -19272,7 +19941,7 @@
 </p:sld>
 </file>
 
-<file path=ppt/slides/slide6.xml><?xml version="1.0" encoding="utf-8"?>
+<file path=ppt/slides/slide8.xml><?xml version="1.0" encoding="utf-8"?>
 <p:sld xmlns:a="http://schemas.openxmlformats.org/drawingml/2006/main" xmlns:r="http://schemas.openxmlformats.org/officeDocument/2006/relationships" xmlns:p="http://schemas.openxmlformats.org/presentationml/2006/main">
   <p:cSld>
     <p:spTree>
@@ -19794,7 +20463,7 @@
 </p:sld>
 </file>
 
-<file path=ppt/slides/slide7.xml><?xml version="1.0" encoding="utf-8"?>
+<file path=ppt/slides/slide9.xml><?xml version="1.0" encoding="utf-8"?>
 <p:sld xmlns:a="http://schemas.openxmlformats.org/drawingml/2006/main" xmlns:r="http://schemas.openxmlformats.org/officeDocument/2006/relationships" xmlns:p="http://schemas.openxmlformats.org/presentationml/2006/main">
   <p:cSld>
     <p:spTree>
@@ -19974,337 +20643,6 @@
     <p:extLst>
       <p:ext uri="{BB962C8B-B14F-4D97-AF65-F5344CB8AC3E}">
         <p14:creationId xmlns:p14="http://schemas.microsoft.com/office/powerpoint/2010/main" val="1853153136"/>
-      </p:ext>
-    </p:extLst>
-  </p:cSld>
-  <p:clrMapOvr>
-    <a:masterClrMapping/>
-  </p:clrMapOvr>
-</p:sld>
-</file>
-
-<file path=ppt/slides/slide8.xml><?xml version="1.0" encoding="utf-8"?>
-<p:sld xmlns:a="http://schemas.openxmlformats.org/drawingml/2006/main" xmlns:r="http://schemas.openxmlformats.org/officeDocument/2006/relationships" xmlns:p="http://schemas.openxmlformats.org/presentationml/2006/main">
-  <p:cSld>
-    <p:spTree>
-      <p:nvGrpSpPr>
-        <p:cNvPr id="1" name=""/>
-        <p:cNvGrpSpPr/>
-        <p:nvPr/>
-      </p:nvGrpSpPr>
-      <p:grpSpPr>
-        <a:xfrm>
-          <a:off x="0" y="0"/>
-          <a:ext cx="0" cy="0"/>
-          <a:chOff x="0" y="0"/>
-          <a:chExt cx="0" cy="0"/>
-        </a:xfrm>
-      </p:grpSpPr>
-      <p:sp>
-        <p:nvSpPr>
-          <p:cNvPr id="2" name="Заглавие 1">
-            <a:extLst>
-              <a:ext uri="{FF2B5EF4-FFF2-40B4-BE49-F238E27FC236}">
-                <a16:creationId xmlns:a16="http://schemas.microsoft.com/office/drawing/2014/main" id="{9E1399E8-5983-477C-B6B3-28BE668C9600}"/>
-              </a:ext>
-            </a:extLst>
-          </p:cNvPr>
-          <p:cNvSpPr>
-            <a:spLocks noGrp="1"/>
-          </p:cNvSpPr>
-          <p:nvPr>
-            <p:ph type="title"/>
-          </p:nvPr>
-        </p:nvSpPr>
-        <p:spPr>
-          <a:xfrm>
-            <a:off x="1154955" y="1295400"/>
-            <a:ext cx="2793158" cy="1183849"/>
-          </a:xfrm>
-        </p:spPr>
-        <p:txBody>
-          <a:bodyPr/>
-          <a:lstStyle/>
-          <a:p>
-            <a:r>
-              <a:rPr lang="en-US" dirty="0">
-                <a:latin typeface="Arial" panose="020B0604020202020204" pitchFamily="34" charset="0"/>
-                <a:cs typeface="Arial" panose="020B0604020202020204" pitchFamily="34" charset="0"/>
-              </a:rPr>
-              <a:t>OEE (Overall Equipment Effectiveness)</a:t>
-            </a:r>
-            <a:endParaRPr lang="bg-BG" dirty="0">
-              <a:latin typeface="Arial" panose="020B0604020202020204" pitchFamily="34" charset="0"/>
-              <a:cs typeface="Arial" panose="020B0604020202020204" pitchFamily="34" charset="0"/>
-            </a:endParaRPr>
-          </a:p>
-        </p:txBody>
-      </p:sp>
-      <p:pic>
-        <p:nvPicPr>
-          <p:cNvPr id="6" name="Контейнер за съдържание 5" descr="Картина, която съдържа текст, визитка, екранна снимка&#10;&#10;Описанието е генерирано автоматично">
-            <a:extLst>
-              <a:ext uri="{FF2B5EF4-FFF2-40B4-BE49-F238E27FC236}">
-                <a16:creationId xmlns:a16="http://schemas.microsoft.com/office/drawing/2014/main" id="{9F36048E-3532-4245-BC24-A230CDD3D910}"/>
-              </a:ext>
-            </a:extLst>
-          </p:cNvPr>
-          <p:cNvPicPr>
-            <a:picLocks noGrp="1" noChangeAspect="1"/>
-          </p:cNvPicPr>
-          <p:nvPr>
-            <p:ph idx="1"/>
-          </p:nvPr>
-        </p:nvPicPr>
-        <p:blipFill>
-          <a:blip r:embed="rId2">
-            <a:extLst>
-              <a:ext uri="{28A0092B-C50C-407E-A947-70E740481C1C}">
-                <a14:useLocalDpi xmlns:a14="http://schemas.microsoft.com/office/drawing/2010/main" val="0"/>
-              </a:ext>
-            </a:extLst>
-          </a:blip>
-          <a:stretch>
-            <a:fillRect/>
-          </a:stretch>
-        </p:blipFill>
-        <p:spPr>
-          <a:xfrm>
-            <a:off x="5513573" y="776813"/>
-            <a:ext cx="4761472" cy="2749750"/>
-          </a:xfrm>
-        </p:spPr>
-      </p:pic>
-      <p:sp>
-        <p:nvSpPr>
-          <p:cNvPr id="4" name="Текстов контейнер 3">
-            <a:extLst>
-              <a:ext uri="{FF2B5EF4-FFF2-40B4-BE49-F238E27FC236}">
-                <a16:creationId xmlns:a16="http://schemas.microsoft.com/office/drawing/2014/main" id="{91B1919B-592E-4D72-8823-6C23A08318C4}"/>
-              </a:ext>
-            </a:extLst>
-          </p:cNvPr>
-          <p:cNvSpPr>
-            <a:spLocks noGrp="1"/>
-          </p:cNvSpPr>
-          <p:nvPr>
-            <p:ph type="body" sz="half" idx="2"/>
-          </p:nvPr>
-        </p:nvSpPr>
-        <p:spPr>
-          <a:xfrm>
-            <a:off x="1154954" y="2724346"/>
-            <a:ext cx="3275644" cy="2611225"/>
-          </a:xfrm>
-        </p:spPr>
-        <p:txBody>
-          <a:bodyPr>
-            <a:normAutofit/>
-          </a:bodyPr>
-          <a:lstStyle/>
-          <a:p>
-            <a:r>
-              <a:rPr lang="en-US" sz="1800" dirty="0">
-                <a:solidFill>
-                  <a:schemeClr val="bg1"/>
-                </a:solidFill>
-                <a:latin typeface="Arial" panose="020B0604020202020204" pitchFamily="34" charset="0"/>
-                <a:cs typeface="Arial" panose="020B0604020202020204" pitchFamily="34" charset="0"/>
-              </a:rPr>
-              <a:t>It’s a gold standard for measuring manufacturing productivity.</a:t>
-            </a:r>
-          </a:p>
-          <a:p>
-            <a:r>
-              <a:rPr lang="en-US" sz="1800" dirty="0">
-                <a:solidFill>
-                  <a:schemeClr val="bg1"/>
-                </a:solidFill>
-                <a:latin typeface="Arial" panose="020B0604020202020204" pitchFamily="34" charset="0"/>
-                <a:cs typeface="Arial" panose="020B0604020202020204" pitchFamily="34" charset="0"/>
-              </a:rPr>
-              <a:t>By measuring of OEE and the underlying losses, we can get important insights on how to systematically improve our manufacturing process.</a:t>
-            </a:r>
-            <a:endParaRPr lang="bg-BG" sz="1800" dirty="0">
-              <a:solidFill>
-                <a:schemeClr val="bg1"/>
-              </a:solidFill>
-              <a:latin typeface="Arial" panose="020B0604020202020204" pitchFamily="34" charset="0"/>
-              <a:cs typeface="Arial" panose="020B0604020202020204" pitchFamily="34" charset="0"/>
-            </a:endParaRPr>
-          </a:p>
-        </p:txBody>
-      </p:sp>
-      <p:pic>
-        <p:nvPicPr>
-          <p:cNvPr id="8" name="Картина 7">
-            <a:extLst>
-              <a:ext uri="{FF2B5EF4-FFF2-40B4-BE49-F238E27FC236}">
-                <a16:creationId xmlns:a16="http://schemas.microsoft.com/office/drawing/2014/main" id="{CB240A52-C317-4489-B730-676821015F8A}"/>
-              </a:ext>
-            </a:extLst>
-          </p:cNvPr>
-          <p:cNvPicPr>
-            <a:picLocks noChangeAspect="1"/>
-          </p:cNvPicPr>
-          <p:nvPr/>
-        </p:nvPicPr>
-        <p:blipFill>
-          <a:blip r:embed="rId3" cstate="hqprint">
-            <a:extLst>
-              <a:ext uri="{28A0092B-C50C-407E-A947-70E740481C1C}">
-                <a14:useLocalDpi xmlns:a14="http://schemas.microsoft.com/office/drawing/2010/main" val="0"/>
-              </a:ext>
-            </a:extLst>
-          </a:blip>
-          <a:stretch>
-            <a:fillRect/>
-          </a:stretch>
-        </p:blipFill>
-        <p:spPr>
-          <a:xfrm>
-            <a:off x="5596506" y="3668803"/>
-            <a:ext cx="4595605" cy="2585028"/>
-          </a:xfrm>
-          <a:prstGeom prst="rect">
-            <a:avLst/>
-          </a:prstGeom>
-        </p:spPr>
-      </p:pic>
-    </p:spTree>
-    <p:extLst>
-      <p:ext uri="{BB962C8B-B14F-4D97-AF65-F5344CB8AC3E}">
-        <p14:creationId xmlns:p14="http://schemas.microsoft.com/office/powerpoint/2010/main" val="2952636599"/>
-      </p:ext>
-    </p:extLst>
-  </p:cSld>
-  <p:clrMapOvr>
-    <a:masterClrMapping/>
-  </p:clrMapOvr>
-</p:sld>
-</file>
-
-<file path=ppt/slides/slide9.xml><?xml version="1.0" encoding="utf-8"?>
-<p:sld xmlns:a="http://schemas.openxmlformats.org/drawingml/2006/main" xmlns:r="http://schemas.openxmlformats.org/officeDocument/2006/relationships" xmlns:p="http://schemas.openxmlformats.org/presentationml/2006/main">
-  <p:cSld>
-    <p:spTree>
-      <p:nvGrpSpPr>
-        <p:cNvPr id="1" name=""/>
-        <p:cNvGrpSpPr/>
-        <p:nvPr/>
-      </p:nvGrpSpPr>
-      <p:grpSpPr>
-        <a:xfrm>
-          <a:off x="0" y="0"/>
-          <a:ext cx="0" cy="0"/>
-          <a:chOff x="0" y="0"/>
-          <a:chExt cx="0" cy="0"/>
-        </a:xfrm>
-      </p:grpSpPr>
-      <p:sp>
-        <p:nvSpPr>
-          <p:cNvPr id="2" name="Заглавие 1">
-            <a:extLst>
-              <a:ext uri="{FF2B5EF4-FFF2-40B4-BE49-F238E27FC236}">
-                <a16:creationId xmlns:a16="http://schemas.microsoft.com/office/drawing/2014/main" id="{43317B4A-D21E-4C75-A6E2-27AADB395689}"/>
-              </a:ext>
-            </a:extLst>
-          </p:cNvPr>
-          <p:cNvSpPr>
-            <a:spLocks noGrp="1"/>
-          </p:cNvSpPr>
-          <p:nvPr>
-            <p:ph type="title"/>
-          </p:nvPr>
-        </p:nvSpPr>
-        <p:spPr/>
-        <p:txBody>
-          <a:bodyPr/>
-          <a:lstStyle/>
-          <a:p>
-            <a:pPr algn="ctr"/>
-            <a:r>
-              <a:rPr lang="en-US" dirty="0">
-                <a:latin typeface="Arial" panose="020B0604020202020204" pitchFamily="34" charset="0"/>
-                <a:cs typeface="Arial" panose="020B0604020202020204" pitchFamily="34" charset="0"/>
-              </a:rPr>
-              <a:t>Smart manufacture</a:t>
-            </a:r>
-            <a:endParaRPr lang="bg-BG" dirty="0">
-              <a:latin typeface="Arial" panose="020B0604020202020204" pitchFamily="34" charset="0"/>
-              <a:cs typeface="Arial" panose="020B0604020202020204" pitchFamily="34" charset="0"/>
-            </a:endParaRPr>
-          </a:p>
-        </p:txBody>
-      </p:sp>
-      <p:pic>
-        <p:nvPicPr>
-          <p:cNvPr id="5" name="Контейнер за съдържание 4">
-            <a:extLst>
-              <a:ext uri="{FF2B5EF4-FFF2-40B4-BE49-F238E27FC236}">
-                <a16:creationId xmlns:a16="http://schemas.microsoft.com/office/drawing/2014/main" id="{50B7D79F-1C0B-4D25-A726-841BCBF5948F}"/>
-              </a:ext>
-            </a:extLst>
-          </p:cNvPr>
-          <p:cNvPicPr>
-            <a:picLocks noGrp="1" noChangeAspect="1"/>
-          </p:cNvPicPr>
-          <p:nvPr>
-            <p:ph idx="1"/>
-          </p:nvPr>
-        </p:nvPicPr>
-        <p:blipFill>
-          <a:blip r:embed="rId2">
-            <a:extLst>
-              <a:ext uri="{28A0092B-C50C-407E-A947-70E740481C1C}">
-                <a14:useLocalDpi xmlns:a14="http://schemas.microsoft.com/office/drawing/2010/main" val="0"/>
-              </a:ext>
-            </a:extLst>
-          </a:blip>
-          <a:stretch>
-            <a:fillRect/>
-          </a:stretch>
-        </p:blipFill>
-        <p:spPr>
-          <a:xfrm>
-            <a:off x="2468881" y="2501900"/>
-            <a:ext cx="6990910" cy="3930468"/>
-          </a:xfrm>
-          <a:prstGeom prst="roundRect">
-            <a:avLst>
-              <a:gd name="adj" fmla="val 4167"/>
-            </a:avLst>
-          </a:prstGeom>
-          <a:solidFill>
-            <a:srgbClr val="FFFFFF"/>
-          </a:solidFill>
-          <a:ln w="76200" cap="sq">
-            <a:solidFill>
-              <a:srgbClr val="EAEAEA"/>
-            </a:solidFill>
-            <a:miter lim="800000"/>
-          </a:ln>
-          <a:effectLst>
-            <a:reflection blurRad="12700" stA="33000" endPos="28000" dist="5000" dir="5400000" sy="-100000" algn="bl" rotWithShape="0"/>
-          </a:effectLst>
-          <a:scene3d>
-            <a:camera prst="orthographicFront"/>
-            <a:lightRig rig="threePt" dir="t">
-              <a:rot lat="0" lon="0" rev="2700000"/>
-            </a:lightRig>
-          </a:scene3d>
-          <a:sp3d contourW="6350">
-            <a:bevelT h="38100"/>
-            <a:contourClr>
-              <a:srgbClr val="C0C0C0"/>
-            </a:contourClr>
-          </a:sp3d>
-        </p:spPr>
-      </p:pic>
-    </p:spTree>
-    <p:extLst>
-      <p:ext uri="{BB962C8B-B14F-4D97-AF65-F5344CB8AC3E}">
-        <p14:creationId xmlns:p14="http://schemas.microsoft.com/office/powerpoint/2010/main" val="1220923656"/>
       </p:ext>
     </p:extLst>
   </p:cSld>

</xml_diff>